<commit_message>
Ch03 start to revise
</commit_message>
<xml_diff>
--- a/src/Accessory/powerPoint/Ch01-FuncLim.pptx
+++ b/src/Accessory/powerPoint/Ch01-FuncLim.pptx
@@ -5,7 +5,7 @@
     <p:sldMasterId id="2147483648" r:id="rId1"/>
   </p:sldMasterIdLst>
   <p:notesMasterIdLst>
-    <p:notesMasterId r:id="rId40"/>
+    <p:notesMasterId r:id="rId43"/>
   </p:notesMasterIdLst>
   <p:sldIdLst>
     <p:sldId id="277" r:id="rId2"/>
@@ -46,6 +46,9 @@
     <p:sldId id="274" r:id="rId37"/>
     <p:sldId id="275" r:id="rId38"/>
     <p:sldId id="276" r:id="rId39"/>
+    <p:sldId id="379" r:id="rId40"/>
+    <p:sldId id="380" r:id="rId41"/>
+    <p:sldId id="381" r:id="rId42"/>
   </p:sldIdLst>
   <p:sldSz cx="12192000" cy="6858000"/>
   <p:notesSz cx="6858000" cy="9144000"/>
@@ -234,7 +237,7 @@
           <a:p>
             <a:fld id="{24C36DCE-442A-5A43-8134-FEFFBA0A9143}" type="datetimeFigureOut">
               <a:rPr kumimoji="1" lang="zh-CN" altLang="en-US" smtClean="0"/>
-              <a:t>2018/10/21</a:t>
+              <a:t>2018/10/24</a:t>
             </a:fld>
             <a:endParaRPr kumimoji="1" lang="zh-CN" altLang="en-US"/>
           </a:p>
@@ -707,7 +710,7 @@
           <a:p>
             <a:fld id="{9621E83B-8A00-1740-ABF2-704BB12B1932}" type="datetimeFigureOut">
               <a:rPr kumimoji="1" lang="zh-CN" altLang="en-US" smtClean="0"/>
-              <a:t>2018/10/21</a:t>
+              <a:t>2018/10/24</a:t>
             </a:fld>
             <a:endParaRPr kumimoji="1" lang="zh-CN" altLang="en-US"/>
           </a:p>
@@ -880,7 +883,7 @@
           <a:p>
             <a:fld id="{9621E83B-8A00-1740-ABF2-704BB12B1932}" type="datetimeFigureOut">
               <a:rPr kumimoji="1" lang="zh-CN" altLang="en-US" smtClean="0"/>
-              <a:t>2018/10/21</a:t>
+              <a:t>2018/10/24</a:t>
             </a:fld>
             <a:endParaRPr kumimoji="1" lang="zh-CN" altLang="en-US"/>
           </a:p>
@@ -1063,7 +1066,7 @@
           <a:p>
             <a:fld id="{9621E83B-8A00-1740-ABF2-704BB12B1932}" type="datetimeFigureOut">
               <a:rPr kumimoji="1" lang="zh-CN" altLang="en-US" smtClean="0"/>
-              <a:t>2018/10/21</a:t>
+              <a:t>2018/10/24</a:t>
             </a:fld>
             <a:endParaRPr kumimoji="1" lang="zh-CN" altLang="en-US"/>
           </a:p>
@@ -1236,7 +1239,7 @@
           <a:p>
             <a:fld id="{9621E83B-8A00-1740-ABF2-704BB12B1932}" type="datetimeFigureOut">
               <a:rPr kumimoji="1" lang="zh-CN" altLang="en-US" smtClean="0"/>
-              <a:t>2018/10/21</a:t>
+              <a:t>2018/10/24</a:t>
             </a:fld>
             <a:endParaRPr kumimoji="1" lang="zh-CN" altLang="en-US"/>
           </a:p>
@@ -1514,7 +1517,7 @@
           <a:p>
             <a:fld id="{9621E83B-8A00-1740-ABF2-704BB12B1932}" type="datetimeFigureOut">
               <a:rPr kumimoji="1" lang="zh-CN" altLang="en-US" smtClean="0"/>
-              <a:t>2018/10/21</a:t>
+              <a:t>2018/10/24</a:t>
             </a:fld>
             <a:endParaRPr kumimoji="1" lang="zh-CN" altLang="en-US"/>
           </a:p>
@@ -1729,7 +1732,7 @@
           <a:p>
             <a:fld id="{9621E83B-8A00-1740-ABF2-704BB12B1932}" type="datetimeFigureOut">
               <a:rPr kumimoji="1" lang="zh-CN" altLang="en-US" smtClean="0"/>
-              <a:t>2018/10/21</a:t>
+              <a:t>2018/10/24</a:t>
             </a:fld>
             <a:endParaRPr kumimoji="1" lang="zh-CN" altLang="en-US"/>
           </a:p>
@@ -2097,7 +2100,7 @@
           <a:p>
             <a:fld id="{9621E83B-8A00-1740-ABF2-704BB12B1932}" type="datetimeFigureOut">
               <a:rPr kumimoji="1" lang="zh-CN" altLang="en-US" smtClean="0"/>
-              <a:t>2018/10/21</a:t>
+              <a:t>2018/10/24</a:t>
             </a:fld>
             <a:endParaRPr kumimoji="1" lang="zh-CN" altLang="en-US"/>
           </a:p>
@@ -2238,7 +2241,7 @@
           <a:p>
             <a:fld id="{9621E83B-8A00-1740-ABF2-704BB12B1932}" type="datetimeFigureOut">
               <a:rPr kumimoji="1" lang="zh-CN" altLang="en-US" smtClean="0"/>
-              <a:t>2018/10/21</a:t>
+              <a:t>2018/10/24</a:t>
             </a:fld>
             <a:endParaRPr kumimoji="1" lang="zh-CN" altLang="en-US"/>
           </a:p>
@@ -2351,7 +2354,7 @@
           <a:p>
             <a:fld id="{9621E83B-8A00-1740-ABF2-704BB12B1932}" type="datetimeFigureOut">
               <a:rPr kumimoji="1" lang="zh-CN" altLang="en-US" smtClean="0"/>
-              <a:t>2018/10/21</a:t>
+              <a:t>2018/10/24</a:t>
             </a:fld>
             <a:endParaRPr kumimoji="1" lang="zh-CN" altLang="en-US"/>
           </a:p>
@@ -2640,7 +2643,7 @@
           <a:p>
             <a:fld id="{9621E83B-8A00-1740-ABF2-704BB12B1932}" type="datetimeFigureOut">
               <a:rPr kumimoji="1" lang="zh-CN" altLang="en-US" smtClean="0"/>
-              <a:t>2018/10/21</a:t>
+              <a:t>2018/10/24</a:t>
             </a:fld>
             <a:endParaRPr kumimoji="1" lang="zh-CN" altLang="en-US"/>
           </a:p>
@@ -2931,7 +2934,7 @@
           <a:p>
             <a:fld id="{9621E83B-8A00-1740-ABF2-704BB12B1932}" type="datetimeFigureOut">
               <a:rPr kumimoji="1" lang="zh-CN" altLang="en-US" smtClean="0"/>
-              <a:t>2018/10/21</a:t>
+              <a:t>2018/10/24</a:t>
             </a:fld>
             <a:endParaRPr kumimoji="1" lang="zh-CN" altLang="en-US"/>
           </a:p>
@@ -3147,7 +3150,7 @@
           <a:p>
             <a:fld id="{9621E83B-8A00-1740-ABF2-704BB12B1932}" type="datetimeFigureOut">
               <a:rPr kumimoji="1" lang="zh-CN" altLang="en-US" smtClean="0"/>
-              <a:t>2018/10/21</a:t>
+              <a:t>2018/10/24</a:t>
             </a:fld>
             <a:endParaRPr kumimoji="1" lang="zh-CN" altLang="en-US"/>
           </a:p>
@@ -35626,6 +35629,904 @@
 </p:sld>
 </file>
 
+<file path=ppt/slides/slide39.xml><?xml version="1.0" encoding="utf-8"?>
+<p:sld xmlns:a="http://schemas.openxmlformats.org/drawingml/2006/main" xmlns:r="http://schemas.openxmlformats.org/officeDocument/2006/relationships" xmlns:p="http://schemas.openxmlformats.org/presentationml/2006/main">
+  <p:cSld>
+    <p:spTree>
+      <p:nvGrpSpPr>
+        <p:cNvPr id="1" name=""/>
+        <p:cNvGrpSpPr/>
+        <p:nvPr/>
+      </p:nvGrpSpPr>
+      <p:grpSpPr>
+        <a:xfrm>
+          <a:off x="0" y="0"/>
+          <a:ext cx="0" cy="0"/>
+          <a:chOff x="0" y="0"/>
+          <a:chExt cx="0" cy="0"/>
+        </a:xfrm>
+      </p:grpSpPr>
+      <p:grpSp>
+        <p:nvGrpSpPr>
+          <p:cNvPr id="19" name="组合 18">
+            <a:extLst>
+              <a:ext uri="{FF2B5EF4-FFF2-40B4-BE49-F238E27FC236}">
+                <a16:creationId xmlns:a16="http://schemas.microsoft.com/office/drawing/2014/main" id="{955AEAC3-1609-0341-A03F-631511606AC8}"/>
+              </a:ext>
+            </a:extLst>
+          </p:cNvPr>
+          <p:cNvGrpSpPr/>
+          <p:nvPr/>
+        </p:nvGrpSpPr>
+        <p:grpSpPr>
+          <a:xfrm>
+            <a:off x="3254600" y="1773719"/>
+            <a:ext cx="5955501" cy="3122132"/>
+            <a:chOff x="3254600" y="1773719"/>
+            <a:chExt cx="5955501" cy="3122132"/>
+          </a:xfrm>
+        </p:grpSpPr>
+        <p:cxnSp>
+          <p:nvCxnSpPr>
+            <p:cNvPr id="6" name="直线箭头连接符 5">
+              <a:extLst>
+                <a:ext uri="{FF2B5EF4-FFF2-40B4-BE49-F238E27FC236}">
+                  <a16:creationId xmlns:a16="http://schemas.microsoft.com/office/drawing/2014/main" id="{C61887D0-A554-5542-9C64-B9C617728EB8}"/>
+                </a:ext>
+              </a:extLst>
+            </p:cNvPr>
+            <p:cNvCxnSpPr>
+              <a:cxnSpLocks/>
+            </p:cNvCxnSpPr>
+            <p:nvPr/>
+          </p:nvCxnSpPr>
+          <p:spPr>
+            <a:xfrm>
+              <a:off x="3272118" y="4416385"/>
+              <a:ext cx="5937983" cy="0"/>
+            </a:xfrm>
+            <a:prstGeom prst="straightConnector1">
+              <a:avLst/>
+            </a:prstGeom>
+            <a:ln>
+              <a:solidFill>
+                <a:schemeClr val="tx1"/>
+              </a:solidFill>
+              <a:tailEnd type="triangle"/>
+            </a:ln>
+          </p:spPr>
+          <p:style>
+            <a:lnRef idx="1">
+              <a:schemeClr val="accent1"/>
+            </a:lnRef>
+            <a:fillRef idx="0">
+              <a:schemeClr val="accent1"/>
+            </a:fillRef>
+            <a:effectRef idx="0">
+              <a:schemeClr val="accent1"/>
+            </a:effectRef>
+            <a:fontRef idx="minor">
+              <a:schemeClr val="tx1"/>
+            </a:fontRef>
+          </p:style>
+        </p:cxnSp>
+        <p:cxnSp>
+          <p:nvCxnSpPr>
+            <p:cNvPr id="7" name="直线箭头连接符 6">
+              <a:extLst>
+                <a:ext uri="{FF2B5EF4-FFF2-40B4-BE49-F238E27FC236}">
+                  <a16:creationId xmlns:a16="http://schemas.microsoft.com/office/drawing/2014/main" id="{1DEA365E-3D4E-0B46-BB34-9C5F95875BE3}"/>
+                </a:ext>
+              </a:extLst>
+            </p:cNvPr>
+            <p:cNvCxnSpPr>
+              <a:cxnSpLocks/>
+            </p:cNvCxnSpPr>
+            <p:nvPr/>
+          </p:nvCxnSpPr>
+          <p:spPr>
+            <a:xfrm flipV="1">
+              <a:off x="3517485" y="1808344"/>
+              <a:ext cx="0" cy="3087507"/>
+            </a:xfrm>
+            <a:prstGeom prst="straightConnector1">
+              <a:avLst/>
+            </a:prstGeom>
+            <a:ln>
+              <a:solidFill>
+                <a:schemeClr val="tx1"/>
+              </a:solidFill>
+              <a:tailEnd type="triangle"/>
+            </a:ln>
+          </p:spPr>
+          <p:style>
+            <a:lnRef idx="1">
+              <a:schemeClr val="accent1"/>
+            </a:lnRef>
+            <a:fillRef idx="0">
+              <a:schemeClr val="accent1"/>
+            </a:fillRef>
+            <a:effectRef idx="0">
+              <a:schemeClr val="accent1"/>
+            </a:effectRef>
+            <a:fontRef idx="minor">
+              <a:schemeClr val="tx1"/>
+            </a:fontRef>
+          </p:style>
+        </p:cxnSp>
+        <mc:AlternateContent xmlns:mc="http://schemas.openxmlformats.org/markup-compatibility/2006">
+          <mc:Choice xmlns:a14="http://schemas.microsoft.com/office/drawing/2010/main" Requires="a14">
+            <p:sp>
+              <p:nvSpPr>
+                <p:cNvPr id="8" name="文本框 7">
+                  <a:extLst>
+                    <a:ext uri="{FF2B5EF4-FFF2-40B4-BE49-F238E27FC236}">
+                      <a16:creationId xmlns:a16="http://schemas.microsoft.com/office/drawing/2014/main" id="{CF4419BA-A785-A146-A086-2F2FB101C3BD}"/>
+                    </a:ext>
+                  </a:extLst>
+                </p:cNvPr>
+                <p:cNvSpPr txBox="1"/>
+                <p:nvPr/>
+              </p:nvSpPr>
+              <p:spPr>
+                <a:xfrm>
+                  <a:off x="3293834" y="4490693"/>
+                  <a:ext cx="223651" cy="276999"/>
+                </a:xfrm>
+                <a:prstGeom prst="rect">
+                  <a:avLst/>
+                </a:prstGeom>
+                <a:noFill/>
+              </p:spPr>
+              <p:txBody>
+                <a:bodyPr wrap="none" lIns="0" tIns="0" rIns="0" bIns="0" rtlCol="0">
+                  <a:spAutoFit/>
+                </a:bodyPr>
+                <a:lstStyle/>
+                <a:p>
+                  <a:pPr/>
+                  <a14:m>
+                    <m:oMathPara xmlns:m="http://schemas.openxmlformats.org/officeDocument/2006/math">
+                      <m:oMathParaPr>
+                        <m:jc m:val="centerGroup"/>
+                      </m:oMathParaPr>
+                      <m:oMath xmlns:m="http://schemas.openxmlformats.org/officeDocument/2006/math">
+                        <m:r>
+                          <a:rPr kumimoji="1" lang="en-US" altLang="zh-CN" b="0" i="1" smtClean="0">
+                            <a:solidFill>
+                              <a:schemeClr val="tx1"/>
+                            </a:solidFill>
+                            <a:latin typeface="Cambria Math" panose="02040503050406030204" pitchFamily="18" charset="0"/>
+                          </a:rPr>
+                          <m:t>𝑂</m:t>
+                        </m:r>
+                      </m:oMath>
+                    </m:oMathPara>
+                  </a14:m>
+                  <a:endParaRPr kumimoji="1" lang="zh-CN" altLang="en-US" dirty="0">
+                    <a:solidFill>
+                      <a:schemeClr val="tx1"/>
+                    </a:solidFill>
+                  </a:endParaRPr>
+                </a:p>
+              </p:txBody>
+            </p:sp>
+          </mc:Choice>
+          <mc:Fallback>
+            <p:sp>
+              <p:nvSpPr>
+                <p:cNvPr id="8" name="文本框 7">
+                  <a:extLst>
+                    <a:ext uri="{FF2B5EF4-FFF2-40B4-BE49-F238E27FC236}">
+                      <a16:creationId xmlns:a16="http://schemas.microsoft.com/office/drawing/2014/main" id="{CF4419BA-A785-A146-A086-2F2FB101C3BD}"/>
+                    </a:ext>
+                  </a:extLst>
+                </p:cNvPr>
+                <p:cNvSpPr txBox="1">
+                  <a:spLocks noRot="1" noChangeAspect="1" noMove="1" noResize="1" noEditPoints="1" noAdjustHandles="1" noChangeArrowheads="1" noChangeShapeType="1" noTextEdit="1"/>
+                </p:cNvSpPr>
+                <p:nvPr/>
+              </p:nvSpPr>
+              <p:spPr>
+                <a:xfrm>
+                  <a:off x="3293834" y="4490693"/>
+                  <a:ext cx="223651" cy="276999"/>
+                </a:xfrm>
+                <a:prstGeom prst="rect">
+                  <a:avLst/>
+                </a:prstGeom>
+                <a:blipFill>
+                  <a:blip r:embed="rId2"/>
+                  <a:stretch>
+                    <a:fillRect l="-15789" r="-15789" b="-4545"/>
+                  </a:stretch>
+                </a:blipFill>
+              </p:spPr>
+              <p:txBody>
+                <a:bodyPr/>
+                <a:lstStyle/>
+                <a:p>
+                  <a:r>
+                    <a:rPr lang="zh-CN" altLang="en-US">
+                      <a:noFill/>
+                    </a:rPr>
+                    <a:t> </a:t>
+                  </a:r>
+                </a:p>
+              </p:txBody>
+            </p:sp>
+          </mc:Fallback>
+        </mc:AlternateContent>
+        <mc:AlternateContent xmlns:mc="http://schemas.openxmlformats.org/markup-compatibility/2006">
+          <mc:Choice xmlns:a14="http://schemas.microsoft.com/office/drawing/2010/main" Requires="a14">
+            <p:sp>
+              <p:nvSpPr>
+                <p:cNvPr id="9" name="文本框 8">
+                  <a:extLst>
+                    <a:ext uri="{FF2B5EF4-FFF2-40B4-BE49-F238E27FC236}">
+                      <a16:creationId xmlns:a16="http://schemas.microsoft.com/office/drawing/2014/main" id="{5DE4D55F-8040-5A4F-BCF5-4EF627444585}"/>
+                    </a:ext>
+                  </a:extLst>
+                </p:cNvPr>
+                <p:cNvSpPr txBox="1"/>
+                <p:nvPr/>
+              </p:nvSpPr>
+              <p:spPr>
+                <a:xfrm>
+                  <a:off x="8923788" y="4437069"/>
+                  <a:ext cx="192938" cy="276999"/>
+                </a:xfrm>
+                <a:prstGeom prst="rect">
+                  <a:avLst/>
+                </a:prstGeom>
+                <a:noFill/>
+              </p:spPr>
+              <p:txBody>
+                <a:bodyPr wrap="none" lIns="0" tIns="0" rIns="0" bIns="0" rtlCol="0">
+                  <a:spAutoFit/>
+                </a:bodyPr>
+                <a:lstStyle/>
+                <a:p>
+                  <a:pPr/>
+                  <a14:m>
+                    <m:oMathPara xmlns:m="http://schemas.openxmlformats.org/officeDocument/2006/math">
+                      <m:oMathParaPr>
+                        <m:jc m:val="centerGroup"/>
+                      </m:oMathParaPr>
+                      <m:oMath xmlns:m="http://schemas.openxmlformats.org/officeDocument/2006/math">
+                        <m:r>
+                          <a:rPr kumimoji="1" lang="en-US" altLang="zh-CN" b="0" i="1" smtClean="0">
+                            <a:solidFill>
+                              <a:schemeClr val="tx1"/>
+                            </a:solidFill>
+                            <a:latin typeface="Cambria Math" panose="02040503050406030204" pitchFamily="18" charset="0"/>
+                          </a:rPr>
+                          <m:t>𝑥</m:t>
+                        </m:r>
+                      </m:oMath>
+                    </m:oMathPara>
+                  </a14:m>
+                  <a:endParaRPr kumimoji="1" lang="zh-CN" altLang="en-US" dirty="0">
+                    <a:solidFill>
+                      <a:schemeClr val="tx1"/>
+                    </a:solidFill>
+                  </a:endParaRPr>
+                </a:p>
+              </p:txBody>
+            </p:sp>
+          </mc:Choice>
+          <mc:Fallback>
+            <p:sp>
+              <p:nvSpPr>
+                <p:cNvPr id="9" name="文本框 8">
+                  <a:extLst>
+                    <a:ext uri="{FF2B5EF4-FFF2-40B4-BE49-F238E27FC236}">
+                      <a16:creationId xmlns:a16="http://schemas.microsoft.com/office/drawing/2014/main" id="{5DE4D55F-8040-5A4F-BCF5-4EF627444585}"/>
+                    </a:ext>
+                  </a:extLst>
+                </p:cNvPr>
+                <p:cNvSpPr txBox="1">
+                  <a:spLocks noRot="1" noChangeAspect="1" noMove="1" noResize="1" noEditPoints="1" noAdjustHandles="1" noChangeArrowheads="1" noChangeShapeType="1" noTextEdit="1"/>
+                </p:cNvSpPr>
+                <p:nvPr/>
+              </p:nvSpPr>
+              <p:spPr>
+                <a:xfrm>
+                  <a:off x="8923788" y="4437069"/>
+                  <a:ext cx="192938" cy="276999"/>
+                </a:xfrm>
+                <a:prstGeom prst="rect">
+                  <a:avLst/>
+                </a:prstGeom>
+                <a:blipFill>
+                  <a:blip r:embed="rId3"/>
+                  <a:stretch>
+                    <a:fillRect l="-12500" r="-6250"/>
+                  </a:stretch>
+                </a:blipFill>
+              </p:spPr>
+              <p:txBody>
+                <a:bodyPr/>
+                <a:lstStyle/>
+                <a:p>
+                  <a:r>
+                    <a:rPr lang="zh-CN" altLang="en-US">
+                      <a:noFill/>
+                    </a:rPr>
+                    <a:t> </a:t>
+                  </a:r>
+                </a:p>
+              </p:txBody>
+            </p:sp>
+          </mc:Fallback>
+        </mc:AlternateContent>
+        <mc:AlternateContent xmlns:mc="http://schemas.openxmlformats.org/markup-compatibility/2006">
+          <mc:Choice xmlns:a14="http://schemas.microsoft.com/office/drawing/2010/main" Requires="a14">
+            <p:sp>
+              <p:nvSpPr>
+                <p:cNvPr id="10" name="文本框 9">
+                  <a:extLst>
+                    <a:ext uri="{FF2B5EF4-FFF2-40B4-BE49-F238E27FC236}">
+                      <a16:creationId xmlns:a16="http://schemas.microsoft.com/office/drawing/2014/main" id="{E2BAE03E-0930-C94E-9EEA-7012F54ECCB6}"/>
+                    </a:ext>
+                  </a:extLst>
+                </p:cNvPr>
+                <p:cNvSpPr txBox="1"/>
+                <p:nvPr/>
+              </p:nvSpPr>
+              <p:spPr>
+                <a:xfrm>
+                  <a:off x="3266708" y="1773719"/>
+                  <a:ext cx="196336" cy="276999"/>
+                </a:xfrm>
+                <a:prstGeom prst="rect">
+                  <a:avLst/>
+                </a:prstGeom>
+                <a:noFill/>
+              </p:spPr>
+              <p:txBody>
+                <a:bodyPr wrap="none" lIns="0" tIns="0" rIns="0" bIns="0" rtlCol="0">
+                  <a:spAutoFit/>
+                </a:bodyPr>
+                <a:lstStyle/>
+                <a:p>
+                  <a:pPr/>
+                  <a14:m>
+                    <m:oMathPara xmlns:m="http://schemas.openxmlformats.org/officeDocument/2006/math">
+                      <m:oMathParaPr>
+                        <m:jc m:val="centerGroup"/>
+                      </m:oMathParaPr>
+                      <m:oMath xmlns:m="http://schemas.openxmlformats.org/officeDocument/2006/math">
+                        <m:r>
+                          <a:rPr kumimoji="1" lang="en-US" altLang="zh-CN" b="0" i="1" smtClean="0">
+                            <a:solidFill>
+                              <a:schemeClr val="tx1"/>
+                            </a:solidFill>
+                            <a:latin typeface="Cambria Math" panose="02040503050406030204" pitchFamily="18" charset="0"/>
+                          </a:rPr>
+                          <m:t>𝑦</m:t>
+                        </m:r>
+                      </m:oMath>
+                    </m:oMathPara>
+                  </a14:m>
+                  <a:endParaRPr kumimoji="1" lang="zh-CN" altLang="en-US" dirty="0">
+                    <a:solidFill>
+                      <a:schemeClr val="tx1"/>
+                    </a:solidFill>
+                  </a:endParaRPr>
+                </a:p>
+              </p:txBody>
+            </p:sp>
+          </mc:Choice>
+          <mc:Fallback>
+            <p:sp>
+              <p:nvSpPr>
+                <p:cNvPr id="10" name="文本框 9">
+                  <a:extLst>
+                    <a:ext uri="{FF2B5EF4-FFF2-40B4-BE49-F238E27FC236}">
+                      <a16:creationId xmlns:a16="http://schemas.microsoft.com/office/drawing/2014/main" id="{E2BAE03E-0930-C94E-9EEA-7012F54ECCB6}"/>
+                    </a:ext>
+                  </a:extLst>
+                </p:cNvPr>
+                <p:cNvSpPr txBox="1">
+                  <a:spLocks noRot="1" noChangeAspect="1" noMove="1" noResize="1" noEditPoints="1" noAdjustHandles="1" noChangeArrowheads="1" noChangeShapeType="1" noTextEdit="1"/>
+                </p:cNvSpPr>
+                <p:nvPr/>
+              </p:nvSpPr>
+              <p:spPr>
+                <a:xfrm>
+                  <a:off x="3266708" y="1773719"/>
+                  <a:ext cx="196336" cy="276999"/>
+                </a:xfrm>
+                <a:prstGeom prst="rect">
+                  <a:avLst/>
+                </a:prstGeom>
+                <a:blipFill>
+                  <a:blip r:embed="rId4"/>
+                  <a:stretch>
+                    <a:fillRect l="-23529" r="-17647" b="-27273"/>
+                  </a:stretch>
+                </a:blipFill>
+              </p:spPr>
+              <p:txBody>
+                <a:bodyPr/>
+                <a:lstStyle/>
+                <a:p>
+                  <a:r>
+                    <a:rPr lang="zh-CN" altLang="en-US">
+                      <a:noFill/>
+                    </a:rPr>
+                    <a:t> </a:t>
+                  </a:r>
+                </a:p>
+              </p:txBody>
+            </p:sp>
+          </mc:Fallback>
+        </mc:AlternateContent>
+        <mc:AlternateContent xmlns:mc="http://schemas.openxmlformats.org/markup-compatibility/2006">
+          <mc:Choice xmlns:a14="http://schemas.microsoft.com/office/drawing/2010/main" Requires="a14">
+            <p:sp>
+              <p:nvSpPr>
+                <p:cNvPr id="15" name="文本框 14">
+                  <a:extLst>
+                    <a:ext uri="{FF2B5EF4-FFF2-40B4-BE49-F238E27FC236}">
+                      <a16:creationId xmlns:a16="http://schemas.microsoft.com/office/drawing/2014/main" id="{224F5680-20CC-4747-AB63-826D613CCA6B}"/>
+                    </a:ext>
+                  </a:extLst>
+                </p:cNvPr>
+                <p:cNvSpPr txBox="1"/>
+                <p:nvPr/>
+              </p:nvSpPr>
+              <p:spPr>
+                <a:xfrm>
+                  <a:off x="3254600" y="3130182"/>
+                  <a:ext cx="210635" cy="276999"/>
+                </a:xfrm>
+                <a:prstGeom prst="rect">
+                  <a:avLst/>
+                </a:prstGeom>
+                <a:noFill/>
+              </p:spPr>
+              <p:txBody>
+                <a:bodyPr wrap="none" lIns="0" tIns="0" rIns="0" bIns="0" rtlCol="0">
+                  <a:spAutoFit/>
+                </a:bodyPr>
+                <a:lstStyle/>
+                <a:p>
+                  <a:pPr/>
+                  <a14:m>
+                    <m:oMathPara xmlns:m="http://schemas.openxmlformats.org/officeDocument/2006/math">
+                      <m:oMathParaPr>
+                        <m:jc m:val="centerGroup"/>
+                      </m:oMathParaPr>
+                      <m:oMath xmlns:m="http://schemas.openxmlformats.org/officeDocument/2006/math">
+                        <m:r>
+                          <a:rPr kumimoji="1" lang="en-US" altLang="zh-CN" b="0" i="1" smtClean="0">
+                            <a:solidFill>
+                              <a:schemeClr val="tx1"/>
+                            </a:solidFill>
+                            <a:latin typeface="Cambria Math" panose="02040503050406030204" pitchFamily="18" charset="0"/>
+                          </a:rPr>
+                          <m:t>𝐴</m:t>
+                        </m:r>
+                      </m:oMath>
+                    </m:oMathPara>
+                  </a14:m>
+                  <a:endParaRPr kumimoji="1" lang="zh-CN" altLang="en-US" dirty="0">
+                    <a:solidFill>
+                      <a:schemeClr val="tx1"/>
+                    </a:solidFill>
+                  </a:endParaRPr>
+                </a:p>
+              </p:txBody>
+            </p:sp>
+          </mc:Choice>
+          <mc:Fallback>
+            <p:sp>
+              <p:nvSpPr>
+                <p:cNvPr id="15" name="文本框 14">
+                  <a:extLst>
+                    <a:ext uri="{FF2B5EF4-FFF2-40B4-BE49-F238E27FC236}">
+                      <a16:creationId xmlns:a16="http://schemas.microsoft.com/office/drawing/2014/main" id="{224F5680-20CC-4747-AB63-826D613CCA6B}"/>
+                    </a:ext>
+                  </a:extLst>
+                </p:cNvPr>
+                <p:cNvSpPr txBox="1">
+                  <a:spLocks noRot="1" noChangeAspect="1" noMove="1" noResize="1" noEditPoints="1" noAdjustHandles="1" noChangeArrowheads="1" noChangeShapeType="1" noTextEdit="1"/>
+                </p:cNvSpPr>
+                <p:nvPr/>
+              </p:nvSpPr>
+              <p:spPr>
+                <a:xfrm>
+                  <a:off x="3254600" y="3130182"/>
+                  <a:ext cx="210635" cy="276999"/>
+                </a:xfrm>
+                <a:prstGeom prst="rect">
+                  <a:avLst/>
+                </a:prstGeom>
+                <a:blipFill>
+                  <a:blip r:embed="rId5"/>
+                  <a:stretch>
+                    <a:fillRect l="-16667" r="-16667" b="-4348"/>
+                  </a:stretch>
+                </a:blipFill>
+              </p:spPr>
+              <p:txBody>
+                <a:bodyPr/>
+                <a:lstStyle/>
+                <a:p>
+                  <a:r>
+                    <a:rPr lang="zh-CN" altLang="en-US">
+                      <a:noFill/>
+                    </a:rPr>
+                    <a:t> </a:t>
+                  </a:r>
+                </a:p>
+              </p:txBody>
+            </p:sp>
+          </mc:Fallback>
+        </mc:AlternateContent>
+        <mc:AlternateContent xmlns:mc="http://schemas.openxmlformats.org/markup-compatibility/2006">
+          <mc:Choice xmlns:a14="http://schemas.microsoft.com/office/drawing/2010/main" Requires="a14">
+            <p:sp>
+              <p:nvSpPr>
+                <p:cNvPr id="16" name="文本框 15">
+                  <a:extLst>
+                    <a:ext uri="{FF2B5EF4-FFF2-40B4-BE49-F238E27FC236}">
+                      <a16:creationId xmlns:a16="http://schemas.microsoft.com/office/drawing/2014/main" id="{41D62503-BC37-FB41-9573-0C9E368E9819}"/>
+                    </a:ext>
+                  </a:extLst>
+                </p:cNvPr>
+                <p:cNvSpPr txBox="1"/>
+                <p:nvPr/>
+              </p:nvSpPr>
+              <p:spPr>
+                <a:xfrm>
+                  <a:off x="6802809" y="2773769"/>
+                  <a:ext cx="547650" cy="307777"/>
+                </a:xfrm>
+                <a:prstGeom prst="rect">
+                  <a:avLst/>
+                </a:prstGeom>
+                <a:noFill/>
+              </p:spPr>
+              <p:txBody>
+                <a:bodyPr wrap="none" lIns="0" tIns="0" rIns="0" bIns="0" rtlCol="0">
+                  <a:spAutoFit/>
+                </a:bodyPr>
+                <a:lstStyle/>
+                <a:p>
+                  <a:pPr/>
+                  <a14:m>
+                    <m:oMathPara xmlns:m="http://schemas.openxmlformats.org/officeDocument/2006/math">
+                      <m:oMathParaPr>
+                        <m:jc m:val="centerGroup"/>
+                      </m:oMathParaPr>
+                      <m:oMath xmlns:m="http://schemas.openxmlformats.org/officeDocument/2006/math">
+                        <m:sSub>
+                          <m:sSubPr>
+                            <m:ctrlPr>
+                              <a:rPr kumimoji="1" lang="en-US" altLang="zh-CN" sz="2000" b="0" i="1" smtClean="0">
+                                <a:solidFill>
+                                  <a:srgbClr val="3DFF00"/>
+                                </a:solidFill>
+                                <a:latin typeface="Cambria Math" panose="02040503050406030204" pitchFamily="18" charset="0"/>
+                              </a:rPr>
+                            </m:ctrlPr>
+                          </m:sSubPr>
+                          <m:e>
+                            <m:r>
+                              <a:rPr kumimoji="1" lang="en-US" altLang="zh-CN" sz="2000" b="0" i="1" smtClean="0">
+                                <a:solidFill>
+                                  <a:srgbClr val="3DFF00"/>
+                                </a:solidFill>
+                                <a:latin typeface="Cambria Math" panose="02040503050406030204" pitchFamily="18" charset="0"/>
+                              </a:rPr>
+                              <m:t>{</m:t>
+                            </m:r>
+                            <m:r>
+                              <a:rPr kumimoji="1" lang="en-US" altLang="zh-CN" sz="2000" b="0" i="1" smtClean="0">
+                                <a:solidFill>
+                                  <a:srgbClr val="3DFF00"/>
+                                </a:solidFill>
+                                <a:latin typeface="Cambria Math" panose="02040503050406030204" pitchFamily="18" charset="0"/>
+                              </a:rPr>
+                              <m:t>𝑎</m:t>
+                            </m:r>
+                          </m:e>
+                          <m:sub>
+                            <m:r>
+                              <a:rPr kumimoji="1" lang="en-US" altLang="zh-CN" sz="2000" b="0" i="1" smtClean="0">
+                                <a:solidFill>
+                                  <a:srgbClr val="3DFF00"/>
+                                </a:solidFill>
+                                <a:latin typeface="Cambria Math" panose="02040503050406030204" pitchFamily="18" charset="0"/>
+                              </a:rPr>
+                              <m:t>𝑛</m:t>
+                            </m:r>
+                          </m:sub>
+                        </m:sSub>
+                        <m:r>
+                          <a:rPr kumimoji="1" lang="en-US" altLang="zh-CN" sz="2000" b="0" i="1" smtClean="0">
+                            <a:solidFill>
+                              <a:srgbClr val="3DFF00"/>
+                            </a:solidFill>
+                            <a:latin typeface="Cambria Math" panose="02040503050406030204" pitchFamily="18" charset="0"/>
+                          </a:rPr>
+                          <m:t>}</m:t>
+                        </m:r>
+                      </m:oMath>
+                    </m:oMathPara>
+                  </a14:m>
+                  <a:endParaRPr kumimoji="1" lang="zh-CN" altLang="en-US" sz="2000" dirty="0">
+                    <a:solidFill>
+                      <a:srgbClr val="3DFF00"/>
+                    </a:solidFill>
+                  </a:endParaRPr>
+                </a:p>
+              </p:txBody>
+            </p:sp>
+          </mc:Choice>
+          <mc:Fallback>
+            <p:sp>
+              <p:nvSpPr>
+                <p:cNvPr id="16" name="文本框 15">
+                  <a:extLst>
+                    <a:ext uri="{FF2B5EF4-FFF2-40B4-BE49-F238E27FC236}">
+                      <a16:creationId xmlns:a16="http://schemas.microsoft.com/office/drawing/2014/main" id="{41D62503-BC37-FB41-9573-0C9E368E9819}"/>
+                    </a:ext>
+                  </a:extLst>
+                </p:cNvPr>
+                <p:cNvSpPr txBox="1">
+                  <a:spLocks noRot="1" noChangeAspect="1" noMove="1" noResize="1" noEditPoints="1" noAdjustHandles="1" noChangeArrowheads="1" noChangeShapeType="1" noTextEdit="1"/>
+                </p:cNvSpPr>
+                <p:nvPr/>
+              </p:nvSpPr>
+              <p:spPr>
+                <a:xfrm>
+                  <a:off x="6802809" y="2773769"/>
+                  <a:ext cx="547650" cy="307777"/>
+                </a:xfrm>
+                <a:prstGeom prst="rect">
+                  <a:avLst/>
+                </a:prstGeom>
+                <a:blipFill>
+                  <a:blip r:embed="rId6"/>
+                  <a:stretch>
+                    <a:fillRect l="-13636" r="-13636" b="-26923"/>
+                  </a:stretch>
+                </a:blipFill>
+              </p:spPr>
+              <p:txBody>
+                <a:bodyPr/>
+                <a:lstStyle/>
+                <a:p>
+                  <a:r>
+                    <a:rPr lang="zh-CN" altLang="en-US">
+                      <a:noFill/>
+                    </a:rPr>
+                    <a:t> </a:t>
+                  </a:r>
+                </a:p>
+              </p:txBody>
+            </p:sp>
+          </mc:Fallback>
+        </mc:AlternateContent>
+        <mc:AlternateContent xmlns:mc="http://schemas.openxmlformats.org/markup-compatibility/2006">
+          <mc:Choice xmlns:a14="http://schemas.microsoft.com/office/drawing/2010/main" Requires="a14">
+            <p:sp>
+              <p:nvSpPr>
+                <p:cNvPr id="17" name="文本框 16">
+                  <a:extLst>
+                    <a:ext uri="{FF2B5EF4-FFF2-40B4-BE49-F238E27FC236}">
+                      <a16:creationId xmlns:a16="http://schemas.microsoft.com/office/drawing/2014/main" id="{E4FD2628-8DC3-A249-8101-24F3BEA63532}"/>
+                    </a:ext>
+                  </a:extLst>
+                </p:cNvPr>
+                <p:cNvSpPr txBox="1"/>
+                <p:nvPr/>
+              </p:nvSpPr>
+              <p:spPr>
+                <a:xfrm>
+                  <a:off x="6802809" y="3714188"/>
+                  <a:ext cx="651589" cy="336374"/>
+                </a:xfrm>
+                <a:prstGeom prst="rect">
+                  <a:avLst/>
+                </a:prstGeom>
+                <a:noFill/>
+              </p:spPr>
+              <p:txBody>
+                <a:bodyPr wrap="none" lIns="0" tIns="0" rIns="0" bIns="0" rtlCol="0">
+                  <a:spAutoFit/>
+                </a:bodyPr>
+                <a:lstStyle/>
+                <a:p>
+                  <a:pPr/>
+                  <a14:m>
+                    <m:oMathPara xmlns:m="http://schemas.openxmlformats.org/officeDocument/2006/math">
+                      <m:oMathParaPr>
+                        <m:jc m:val="centerGroup"/>
+                      </m:oMathParaPr>
+                      <m:oMath xmlns:m="http://schemas.openxmlformats.org/officeDocument/2006/math">
+                        <m:sSub>
+                          <m:sSubPr>
+                            <m:ctrlPr>
+                              <a:rPr kumimoji="1" lang="en-US" altLang="zh-CN" sz="2000" b="0" i="1" smtClean="0">
+                                <a:solidFill>
+                                  <a:srgbClr val="FF0000"/>
+                                </a:solidFill>
+                                <a:latin typeface="Cambria Math" panose="02040503050406030204" pitchFamily="18" charset="0"/>
+                              </a:rPr>
+                            </m:ctrlPr>
+                          </m:sSubPr>
+                          <m:e>
+                            <m:r>
+                              <a:rPr kumimoji="1" lang="en-US" altLang="zh-CN" sz="2000" b="0" i="1" smtClean="0">
+                                <a:solidFill>
+                                  <a:srgbClr val="FF0000"/>
+                                </a:solidFill>
+                                <a:latin typeface="Cambria Math" panose="02040503050406030204" pitchFamily="18" charset="0"/>
+                              </a:rPr>
+                              <m:t>{</m:t>
+                            </m:r>
+                            <m:r>
+                              <a:rPr kumimoji="1" lang="en-US" altLang="zh-CN" sz="2000" b="0" i="1" smtClean="0">
+                                <a:solidFill>
+                                  <a:srgbClr val="FF0000"/>
+                                </a:solidFill>
+                                <a:latin typeface="Cambria Math" panose="02040503050406030204" pitchFamily="18" charset="0"/>
+                              </a:rPr>
+                              <m:t>𝑎</m:t>
+                            </m:r>
+                          </m:e>
+                          <m:sub>
+                            <m:sSub>
+                              <m:sSubPr>
+                                <m:ctrlPr>
+                                  <a:rPr kumimoji="1" lang="en-US" altLang="zh-CN" sz="2000" b="0" i="1" smtClean="0">
+                                    <a:solidFill>
+                                      <a:srgbClr val="FF0000"/>
+                                    </a:solidFill>
+                                    <a:latin typeface="Cambria Math" panose="02040503050406030204" pitchFamily="18" charset="0"/>
+                                  </a:rPr>
+                                </m:ctrlPr>
+                              </m:sSubPr>
+                              <m:e>
+                                <m:r>
+                                  <a:rPr kumimoji="1" lang="en-US" altLang="zh-CN" sz="2000" b="0" i="1" smtClean="0">
+                                    <a:solidFill>
+                                      <a:srgbClr val="FF0000"/>
+                                    </a:solidFill>
+                                    <a:latin typeface="Cambria Math" panose="02040503050406030204" pitchFamily="18" charset="0"/>
+                                  </a:rPr>
+                                  <m:t>𝑛</m:t>
+                                </m:r>
+                              </m:e>
+                              <m:sub>
+                                <m:r>
+                                  <a:rPr kumimoji="1" lang="en-US" altLang="zh-CN" sz="2000" b="0" i="1" smtClean="0">
+                                    <a:solidFill>
+                                      <a:srgbClr val="FF0000"/>
+                                    </a:solidFill>
+                                    <a:latin typeface="Cambria Math" panose="02040503050406030204" pitchFamily="18" charset="0"/>
+                                  </a:rPr>
+                                  <m:t>𝑘</m:t>
+                                </m:r>
+                              </m:sub>
+                            </m:sSub>
+                          </m:sub>
+                        </m:sSub>
+                        <m:r>
+                          <a:rPr kumimoji="1" lang="en-US" altLang="zh-CN" sz="2000" b="0" i="1" smtClean="0">
+                            <a:solidFill>
+                              <a:srgbClr val="FF0000"/>
+                            </a:solidFill>
+                            <a:latin typeface="Cambria Math" panose="02040503050406030204" pitchFamily="18" charset="0"/>
+                          </a:rPr>
+                          <m:t>}</m:t>
+                        </m:r>
+                      </m:oMath>
+                    </m:oMathPara>
+                  </a14:m>
+                  <a:endParaRPr kumimoji="1" lang="zh-CN" altLang="en-US" sz="2000" dirty="0">
+                    <a:solidFill>
+                      <a:srgbClr val="FF0000"/>
+                    </a:solidFill>
+                  </a:endParaRPr>
+                </a:p>
+              </p:txBody>
+            </p:sp>
+          </mc:Choice>
+          <mc:Fallback>
+            <p:sp>
+              <p:nvSpPr>
+                <p:cNvPr id="17" name="文本框 16">
+                  <a:extLst>
+                    <a:ext uri="{FF2B5EF4-FFF2-40B4-BE49-F238E27FC236}">
+                      <a16:creationId xmlns:a16="http://schemas.microsoft.com/office/drawing/2014/main" id="{E4FD2628-8DC3-A249-8101-24F3BEA63532}"/>
+                    </a:ext>
+                  </a:extLst>
+                </p:cNvPr>
+                <p:cNvSpPr txBox="1">
+                  <a:spLocks noRot="1" noChangeAspect="1" noMove="1" noResize="1" noEditPoints="1" noAdjustHandles="1" noChangeArrowheads="1" noChangeShapeType="1" noTextEdit="1"/>
+                </p:cNvSpPr>
+                <p:nvPr/>
+              </p:nvSpPr>
+              <p:spPr>
+                <a:xfrm>
+                  <a:off x="6802809" y="3714188"/>
+                  <a:ext cx="651589" cy="336374"/>
+                </a:xfrm>
+                <a:prstGeom prst="rect">
+                  <a:avLst/>
+                </a:prstGeom>
+                <a:blipFill>
+                  <a:blip r:embed="rId7"/>
+                  <a:stretch>
+                    <a:fillRect l="-11538" r="-11538" b="-17857"/>
+                  </a:stretch>
+                </a:blipFill>
+              </p:spPr>
+              <p:txBody>
+                <a:bodyPr/>
+                <a:lstStyle/>
+                <a:p>
+                  <a:r>
+                    <a:rPr lang="zh-CN" altLang="en-US">
+                      <a:noFill/>
+                    </a:rPr>
+                    <a:t> </a:t>
+                  </a:r>
+                </a:p>
+              </p:txBody>
+            </p:sp>
+          </mc:Fallback>
+        </mc:AlternateContent>
+        <p:pic>
+          <p:nvPicPr>
+            <p:cNvPr id="5" name="图片 4">
+              <a:extLst>
+                <a:ext uri="{FF2B5EF4-FFF2-40B4-BE49-F238E27FC236}">
+                  <a16:creationId xmlns:a16="http://schemas.microsoft.com/office/drawing/2014/main" id="{10DCAE1A-C3EC-E441-B9A1-BFD03CCA680B}"/>
+                </a:ext>
+              </a:extLst>
+            </p:cNvPr>
+            <p:cNvPicPr>
+              <a:picLocks noChangeAspect="1"/>
+            </p:cNvPicPr>
+            <p:nvPr/>
+          </p:nvPicPr>
+          <p:blipFill>
+            <a:blip r:embed="rId8"/>
+            <a:stretch>
+              <a:fillRect/>
+            </a:stretch>
+          </p:blipFill>
+          <p:spPr>
+            <a:xfrm>
+              <a:off x="3329159" y="1940331"/>
+              <a:ext cx="5854700" cy="2933700"/>
+            </a:xfrm>
+            <a:prstGeom prst="rect">
+              <a:avLst/>
+            </a:prstGeom>
+          </p:spPr>
+        </p:pic>
+      </p:grpSp>
+    </p:spTree>
+    <p:extLst>
+      <p:ext uri="{BB962C8B-B14F-4D97-AF65-F5344CB8AC3E}">
+        <p14:creationId xmlns:p14="http://schemas.microsoft.com/office/powerpoint/2010/main" val="803195164"/>
+      </p:ext>
+    </p:extLst>
+  </p:cSld>
+  <p:clrMapOvr>
+    <a:masterClrMapping/>
+  </p:clrMapOvr>
+</p:sld>
+</file>
+
 <file path=ppt/slides/slide4.xml><?xml version="1.0" encoding="utf-8"?>
 <p:sld xmlns:a="http://schemas.openxmlformats.org/drawingml/2006/main" xmlns:r="http://schemas.openxmlformats.org/officeDocument/2006/relationships" xmlns:p="http://schemas.openxmlformats.org/presentationml/2006/main">
   <p:cSld>
@@ -37026,6 +37927,1970 @@
     <p:extLst>
       <p:ext uri="{BB962C8B-B14F-4D97-AF65-F5344CB8AC3E}">
         <p14:creationId xmlns:p14="http://schemas.microsoft.com/office/powerpoint/2010/main" val="1290447636"/>
+      </p:ext>
+    </p:extLst>
+  </p:cSld>
+  <p:clrMapOvr>
+    <a:masterClrMapping/>
+  </p:clrMapOvr>
+</p:sld>
+</file>
+
+<file path=ppt/slides/slide40.xml><?xml version="1.0" encoding="utf-8"?>
+<p:sld xmlns:a="http://schemas.openxmlformats.org/drawingml/2006/main" xmlns:r="http://schemas.openxmlformats.org/officeDocument/2006/relationships" xmlns:p="http://schemas.openxmlformats.org/presentationml/2006/main">
+  <p:cSld>
+    <p:spTree>
+      <p:nvGrpSpPr>
+        <p:cNvPr id="1" name=""/>
+        <p:cNvGrpSpPr/>
+        <p:nvPr/>
+      </p:nvGrpSpPr>
+      <p:grpSpPr>
+        <a:xfrm>
+          <a:off x="0" y="0"/>
+          <a:ext cx="0" cy="0"/>
+          <a:chOff x="0" y="0"/>
+          <a:chExt cx="0" cy="0"/>
+        </a:xfrm>
+      </p:grpSpPr>
+      <p:grpSp>
+        <p:nvGrpSpPr>
+          <p:cNvPr id="19" name="组合 18">
+            <a:extLst>
+              <a:ext uri="{FF2B5EF4-FFF2-40B4-BE49-F238E27FC236}">
+                <a16:creationId xmlns:a16="http://schemas.microsoft.com/office/drawing/2014/main" id="{D726A16F-92F9-6E42-A7A3-C79DD65378BA}"/>
+              </a:ext>
+            </a:extLst>
+          </p:cNvPr>
+          <p:cNvGrpSpPr/>
+          <p:nvPr/>
+        </p:nvGrpSpPr>
+        <p:grpSpPr>
+          <a:xfrm>
+            <a:off x="3266708" y="1707617"/>
+            <a:ext cx="5591542" cy="3434648"/>
+            <a:chOff x="3266708" y="1707617"/>
+            <a:chExt cx="5591542" cy="3434648"/>
+          </a:xfrm>
+        </p:grpSpPr>
+        <p:pic>
+          <p:nvPicPr>
+            <p:cNvPr id="4" name="图片 3">
+              <a:extLst>
+                <a:ext uri="{FF2B5EF4-FFF2-40B4-BE49-F238E27FC236}">
+                  <a16:creationId xmlns:a16="http://schemas.microsoft.com/office/drawing/2014/main" id="{0A10BC4F-182E-F344-B773-4F6F34B44D5E}"/>
+                </a:ext>
+              </a:extLst>
+            </p:cNvPr>
+            <p:cNvPicPr>
+              <a:picLocks noChangeAspect="1"/>
+            </p:cNvPicPr>
+            <p:nvPr/>
+          </p:nvPicPr>
+          <p:blipFill>
+            <a:blip r:embed="rId2"/>
+            <a:stretch>
+              <a:fillRect/>
+            </a:stretch>
+          </p:blipFill>
+          <p:spPr>
+            <a:xfrm>
+              <a:off x="3333750" y="1720850"/>
+              <a:ext cx="5524500" cy="3416300"/>
+            </a:xfrm>
+            <a:prstGeom prst="rect">
+              <a:avLst/>
+            </a:prstGeom>
+          </p:spPr>
+        </p:pic>
+        <p:cxnSp>
+          <p:nvCxnSpPr>
+            <p:cNvPr id="6" name="直线箭头连接符 5">
+              <a:extLst>
+                <a:ext uri="{FF2B5EF4-FFF2-40B4-BE49-F238E27FC236}">
+                  <a16:creationId xmlns:a16="http://schemas.microsoft.com/office/drawing/2014/main" id="{F6E2814B-F31C-F840-A927-E0E7E9ADC369}"/>
+                </a:ext>
+              </a:extLst>
+            </p:cNvPr>
+            <p:cNvCxnSpPr>
+              <a:cxnSpLocks/>
+            </p:cNvCxnSpPr>
+            <p:nvPr/>
+          </p:nvCxnSpPr>
+          <p:spPr>
+            <a:xfrm>
+              <a:off x="3272118" y="4790958"/>
+              <a:ext cx="5586132" cy="0"/>
+            </a:xfrm>
+            <a:prstGeom prst="straightConnector1">
+              <a:avLst/>
+            </a:prstGeom>
+            <a:ln>
+              <a:solidFill>
+                <a:schemeClr val="tx1"/>
+              </a:solidFill>
+              <a:tailEnd type="triangle"/>
+            </a:ln>
+          </p:spPr>
+          <p:style>
+            <a:lnRef idx="1">
+              <a:schemeClr val="accent1"/>
+            </a:lnRef>
+            <a:fillRef idx="0">
+              <a:schemeClr val="accent1"/>
+            </a:fillRef>
+            <a:effectRef idx="0">
+              <a:schemeClr val="accent1"/>
+            </a:effectRef>
+            <a:fontRef idx="minor">
+              <a:schemeClr val="tx1"/>
+            </a:fontRef>
+          </p:style>
+        </p:cxnSp>
+        <p:cxnSp>
+          <p:nvCxnSpPr>
+            <p:cNvPr id="7" name="直线箭头连接符 6">
+              <a:extLst>
+                <a:ext uri="{FF2B5EF4-FFF2-40B4-BE49-F238E27FC236}">
+                  <a16:creationId xmlns:a16="http://schemas.microsoft.com/office/drawing/2014/main" id="{03307C72-C22D-7C4C-A362-08C8C43B205A}"/>
+                </a:ext>
+              </a:extLst>
+            </p:cNvPr>
+            <p:cNvCxnSpPr>
+              <a:cxnSpLocks/>
+            </p:cNvCxnSpPr>
+            <p:nvPr/>
+          </p:nvCxnSpPr>
+          <p:spPr>
+            <a:xfrm flipV="1">
+              <a:off x="3517485" y="1720850"/>
+              <a:ext cx="0" cy="3280808"/>
+            </a:xfrm>
+            <a:prstGeom prst="straightConnector1">
+              <a:avLst/>
+            </a:prstGeom>
+            <a:ln>
+              <a:solidFill>
+                <a:schemeClr val="tx1"/>
+              </a:solidFill>
+              <a:tailEnd type="triangle"/>
+            </a:ln>
+          </p:spPr>
+          <p:style>
+            <a:lnRef idx="1">
+              <a:schemeClr val="accent1"/>
+            </a:lnRef>
+            <a:fillRef idx="0">
+              <a:schemeClr val="accent1"/>
+            </a:fillRef>
+            <a:effectRef idx="0">
+              <a:schemeClr val="accent1"/>
+            </a:effectRef>
+            <a:fontRef idx="minor">
+              <a:schemeClr val="tx1"/>
+            </a:fontRef>
+          </p:style>
+        </p:cxnSp>
+        <mc:AlternateContent xmlns:mc="http://schemas.openxmlformats.org/markup-compatibility/2006">
+          <mc:Choice xmlns:a14="http://schemas.microsoft.com/office/drawing/2010/main" Requires="a14">
+            <p:sp>
+              <p:nvSpPr>
+                <p:cNvPr id="8" name="文本框 7">
+                  <a:extLst>
+                    <a:ext uri="{FF2B5EF4-FFF2-40B4-BE49-F238E27FC236}">
+                      <a16:creationId xmlns:a16="http://schemas.microsoft.com/office/drawing/2014/main" id="{E8D820FA-E530-9045-8C03-3A757FD44E27}"/>
+                    </a:ext>
+                  </a:extLst>
+                </p:cNvPr>
+                <p:cNvSpPr txBox="1"/>
+                <p:nvPr/>
+              </p:nvSpPr>
+              <p:spPr>
+                <a:xfrm>
+                  <a:off x="3293834" y="4865266"/>
+                  <a:ext cx="223651" cy="276999"/>
+                </a:xfrm>
+                <a:prstGeom prst="rect">
+                  <a:avLst/>
+                </a:prstGeom>
+                <a:noFill/>
+              </p:spPr>
+              <p:txBody>
+                <a:bodyPr wrap="none" lIns="0" tIns="0" rIns="0" bIns="0" rtlCol="0">
+                  <a:spAutoFit/>
+                </a:bodyPr>
+                <a:lstStyle/>
+                <a:p>
+                  <a:pPr/>
+                  <a14:m>
+                    <m:oMathPara xmlns:m="http://schemas.openxmlformats.org/officeDocument/2006/math">
+                      <m:oMathParaPr>
+                        <m:jc m:val="centerGroup"/>
+                      </m:oMathParaPr>
+                      <m:oMath xmlns:m="http://schemas.openxmlformats.org/officeDocument/2006/math">
+                        <m:r>
+                          <a:rPr kumimoji="1" lang="en-US" altLang="zh-CN" b="0" i="1" smtClean="0">
+                            <a:solidFill>
+                              <a:schemeClr val="tx1"/>
+                            </a:solidFill>
+                            <a:latin typeface="Cambria Math" panose="02040503050406030204" pitchFamily="18" charset="0"/>
+                          </a:rPr>
+                          <m:t>𝑂</m:t>
+                        </m:r>
+                      </m:oMath>
+                    </m:oMathPara>
+                  </a14:m>
+                  <a:endParaRPr kumimoji="1" lang="zh-CN" altLang="en-US" dirty="0">
+                    <a:solidFill>
+                      <a:schemeClr val="tx1"/>
+                    </a:solidFill>
+                  </a:endParaRPr>
+                </a:p>
+              </p:txBody>
+            </p:sp>
+          </mc:Choice>
+          <mc:Fallback>
+            <p:sp>
+              <p:nvSpPr>
+                <p:cNvPr id="8" name="文本框 7">
+                  <a:extLst>
+                    <a:ext uri="{FF2B5EF4-FFF2-40B4-BE49-F238E27FC236}">
+                      <a16:creationId xmlns:a16="http://schemas.microsoft.com/office/drawing/2014/main" id="{E8D820FA-E530-9045-8C03-3A757FD44E27}"/>
+                    </a:ext>
+                  </a:extLst>
+                </p:cNvPr>
+                <p:cNvSpPr txBox="1">
+                  <a:spLocks noRot="1" noChangeAspect="1" noMove="1" noResize="1" noEditPoints="1" noAdjustHandles="1" noChangeArrowheads="1" noChangeShapeType="1" noTextEdit="1"/>
+                </p:cNvSpPr>
+                <p:nvPr/>
+              </p:nvSpPr>
+              <p:spPr>
+                <a:xfrm>
+                  <a:off x="3293834" y="4865266"/>
+                  <a:ext cx="223651" cy="276999"/>
+                </a:xfrm>
+                <a:prstGeom prst="rect">
+                  <a:avLst/>
+                </a:prstGeom>
+                <a:blipFill>
+                  <a:blip r:embed="rId3"/>
+                  <a:stretch>
+                    <a:fillRect l="-15789" r="-15789" b="-4348"/>
+                  </a:stretch>
+                </a:blipFill>
+              </p:spPr>
+              <p:txBody>
+                <a:bodyPr/>
+                <a:lstStyle/>
+                <a:p>
+                  <a:r>
+                    <a:rPr lang="zh-CN" altLang="en-US">
+                      <a:noFill/>
+                    </a:rPr>
+                    <a:t> </a:t>
+                  </a:r>
+                </a:p>
+              </p:txBody>
+            </p:sp>
+          </mc:Fallback>
+        </mc:AlternateContent>
+        <mc:AlternateContent xmlns:mc="http://schemas.openxmlformats.org/markup-compatibility/2006">
+          <mc:Choice xmlns:a14="http://schemas.microsoft.com/office/drawing/2010/main" Requires="a14">
+            <p:sp>
+              <p:nvSpPr>
+                <p:cNvPr id="9" name="文本框 8">
+                  <a:extLst>
+                    <a:ext uri="{FF2B5EF4-FFF2-40B4-BE49-F238E27FC236}">
+                      <a16:creationId xmlns:a16="http://schemas.microsoft.com/office/drawing/2014/main" id="{ED0FF1B1-D7DC-5F4E-AEFB-6D11A642DB7D}"/>
+                    </a:ext>
+                  </a:extLst>
+                </p:cNvPr>
+                <p:cNvSpPr txBox="1"/>
+                <p:nvPr/>
+              </p:nvSpPr>
+              <p:spPr>
+                <a:xfrm>
+                  <a:off x="8651432" y="4837014"/>
+                  <a:ext cx="192938" cy="276999"/>
+                </a:xfrm>
+                <a:prstGeom prst="rect">
+                  <a:avLst/>
+                </a:prstGeom>
+                <a:noFill/>
+              </p:spPr>
+              <p:txBody>
+                <a:bodyPr wrap="none" lIns="0" tIns="0" rIns="0" bIns="0" rtlCol="0">
+                  <a:spAutoFit/>
+                </a:bodyPr>
+                <a:lstStyle/>
+                <a:p>
+                  <a:pPr/>
+                  <a14:m>
+                    <m:oMathPara xmlns:m="http://schemas.openxmlformats.org/officeDocument/2006/math">
+                      <m:oMathParaPr>
+                        <m:jc m:val="centerGroup"/>
+                      </m:oMathParaPr>
+                      <m:oMath xmlns:m="http://schemas.openxmlformats.org/officeDocument/2006/math">
+                        <m:r>
+                          <a:rPr kumimoji="1" lang="en-US" altLang="zh-CN" b="0" i="1" smtClean="0">
+                            <a:solidFill>
+                              <a:schemeClr val="tx1"/>
+                            </a:solidFill>
+                            <a:latin typeface="Cambria Math" panose="02040503050406030204" pitchFamily="18" charset="0"/>
+                          </a:rPr>
+                          <m:t>𝑥</m:t>
+                        </m:r>
+                      </m:oMath>
+                    </m:oMathPara>
+                  </a14:m>
+                  <a:endParaRPr kumimoji="1" lang="zh-CN" altLang="en-US" dirty="0">
+                    <a:solidFill>
+                      <a:schemeClr val="tx1"/>
+                    </a:solidFill>
+                  </a:endParaRPr>
+                </a:p>
+              </p:txBody>
+            </p:sp>
+          </mc:Choice>
+          <mc:Fallback>
+            <p:sp>
+              <p:nvSpPr>
+                <p:cNvPr id="9" name="文本框 8">
+                  <a:extLst>
+                    <a:ext uri="{FF2B5EF4-FFF2-40B4-BE49-F238E27FC236}">
+                      <a16:creationId xmlns:a16="http://schemas.microsoft.com/office/drawing/2014/main" id="{ED0FF1B1-D7DC-5F4E-AEFB-6D11A642DB7D}"/>
+                    </a:ext>
+                  </a:extLst>
+                </p:cNvPr>
+                <p:cNvSpPr txBox="1">
+                  <a:spLocks noRot="1" noChangeAspect="1" noMove="1" noResize="1" noEditPoints="1" noAdjustHandles="1" noChangeArrowheads="1" noChangeShapeType="1" noTextEdit="1"/>
+                </p:cNvSpPr>
+                <p:nvPr/>
+              </p:nvSpPr>
+              <p:spPr>
+                <a:xfrm>
+                  <a:off x="8651432" y="4837014"/>
+                  <a:ext cx="192938" cy="276999"/>
+                </a:xfrm>
+                <a:prstGeom prst="rect">
+                  <a:avLst/>
+                </a:prstGeom>
+                <a:blipFill>
+                  <a:blip r:embed="rId4"/>
+                  <a:stretch>
+                    <a:fillRect l="-12500" r="-6250"/>
+                  </a:stretch>
+                </a:blipFill>
+              </p:spPr>
+              <p:txBody>
+                <a:bodyPr/>
+                <a:lstStyle/>
+                <a:p>
+                  <a:r>
+                    <a:rPr lang="zh-CN" altLang="en-US">
+                      <a:noFill/>
+                    </a:rPr>
+                    <a:t> </a:t>
+                  </a:r>
+                </a:p>
+              </p:txBody>
+            </p:sp>
+          </mc:Fallback>
+        </mc:AlternateContent>
+        <mc:AlternateContent xmlns:mc="http://schemas.openxmlformats.org/markup-compatibility/2006">
+          <mc:Choice xmlns:a14="http://schemas.microsoft.com/office/drawing/2010/main" Requires="a14">
+            <p:sp>
+              <p:nvSpPr>
+                <p:cNvPr id="10" name="文本框 9">
+                  <a:extLst>
+                    <a:ext uri="{FF2B5EF4-FFF2-40B4-BE49-F238E27FC236}">
+                      <a16:creationId xmlns:a16="http://schemas.microsoft.com/office/drawing/2014/main" id="{05C4E142-BAF5-D942-9B99-FB4950F1A8FB}"/>
+                    </a:ext>
+                  </a:extLst>
+                </p:cNvPr>
+                <p:cNvSpPr txBox="1"/>
+                <p:nvPr/>
+              </p:nvSpPr>
+              <p:spPr>
+                <a:xfrm>
+                  <a:off x="3266708" y="1707617"/>
+                  <a:ext cx="196336" cy="276999"/>
+                </a:xfrm>
+                <a:prstGeom prst="rect">
+                  <a:avLst/>
+                </a:prstGeom>
+                <a:noFill/>
+              </p:spPr>
+              <p:txBody>
+                <a:bodyPr wrap="none" lIns="0" tIns="0" rIns="0" bIns="0" rtlCol="0">
+                  <a:spAutoFit/>
+                </a:bodyPr>
+                <a:lstStyle/>
+                <a:p>
+                  <a:pPr/>
+                  <a14:m>
+                    <m:oMathPara xmlns:m="http://schemas.openxmlformats.org/officeDocument/2006/math">
+                      <m:oMathParaPr>
+                        <m:jc m:val="centerGroup"/>
+                      </m:oMathParaPr>
+                      <m:oMath xmlns:m="http://schemas.openxmlformats.org/officeDocument/2006/math">
+                        <m:r>
+                          <a:rPr kumimoji="1" lang="en-US" altLang="zh-CN" b="0" i="1" smtClean="0">
+                            <a:solidFill>
+                              <a:schemeClr val="tx1"/>
+                            </a:solidFill>
+                            <a:latin typeface="Cambria Math" panose="02040503050406030204" pitchFamily="18" charset="0"/>
+                          </a:rPr>
+                          <m:t>𝑦</m:t>
+                        </m:r>
+                      </m:oMath>
+                    </m:oMathPara>
+                  </a14:m>
+                  <a:endParaRPr kumimoji="1" lang="zh-CN" altLang="en-US" dirty="0">
+                    <a:solidFill>
+                      <a:schemeClr val="tx1"/>
+                    </a:solidFill>
+                  </a:endParaRPr>
+                </a:p>
+              </p:txBody>
+            </p:sp>
+          </mc:Choice>
+          <mc:Fallback>
+            <p:sp>
+              <p:nvSpPr>
+                <p:cNvPr id="10" name="文本框 9">
+                  <a:extLst>
+                    <a:ext uri="{FF2B5EF4-FFF2-40B4-BE49-F238E27FC236}">
+                      <a16:creationId xmlns:a16="http://schemas.microsoft.com/office/drawing/2014/main" id="{05C4E142-BAF5-D942-9B99-FB4950F1A8FB}"/>
+                    </a:ext>
+                  </a:extLst>
+                </p:cNvPr>
+                <p:cNvSpPr txBox="1">
+                  <a:spLocks noRot="1" noChangeAspect="1" noMove="1" noResize="1" noEditPoints="1" noAdjustHandles="1" noChangeArrowheads="1" noChangeShapeType="1" noTextEdit="1"/>
+                </p:cNvSpPr>
+                <p:nvPr/>
+              </p:nvSpPr>
+              <p:spPr>
+                <a:xfrm>
+                  <a:off x="3266708" y="1707617"/>
+                  <a:ext cx="196336" cy="276999"/>
+                </a:xfrm>
+                <a:prstGeom prst="rect">
+                  <a:avLst/>
+                </a:prstGeom>
+                <a:blipFill>
+                  <a:blip r:embed="rId5"/>
+                  <a:stretch>
+                    <a:fillRect l="-23529" r="-17647" b="-26087"/>
+                  </a:stretch>
+                </a:blipFill>
+              </p:spPr>
+              <p:txBody>
+                <a:bodyPr/>
+                <a:lstStyle/>
+                <a:p>
+                  <a:r>
+                    <a:rPr lang="zh-CN" altLang="en-US">
+                      <a:noFill/>
+                    </a:rPr>
+                    <a:t> </a:t>
+                  </a:r>
+                </a:p>
+              </p:txBody>
+            </p:sp>
+          </mc:Fallback>
+        </mc:AlternateContent>
+        <mc:AlternateContent xmlns:mc="http://schemas.openxmlformats.org/markup-compatibility/2006">
+          <mc:Choice xmlns:a14="http://schemas.microsoft.com/office/drawing/2010/main" Requires="a14">
+            <p:sp>
+              <p:nvSpPr>
+                <p:cNvPr id="11" name="文本框 10">
+                  <a:extLst>
+                    <a:ext uri="{FF2B5EF4-FFF2-40B4-BE49-F238E27FC236}">
+                      <a16:creationId xmlns:a16="http://schemas.microsoft.com/office/drawing/2014/main" id="{87AA86BD-7098-E248-91B1-6A90C45B0ACB}"/>
+                    </a:ext>
+                  </a:extLst>
+                </p:cNvPr>
+                <p:cNvSpPr txBox="1"/>
+                <p:nvPr/>
+              </p:nvSpPr>
+              <p:spPr>
+                <a:xfrm>
+                  <a:off x="3266708" y="3748697"/>
+                  <a:ext cx="210635" cy="276999"/>
+                </a:xfrm>
+                <a:prstGeom prst="rect">
+                  <a:avLst/>
+                </a:prstGeom>
+                <a:noFill/>
+              </p:spPr>
+              <p:txBody>
+                <a:bodyPr wrap="none" lIns="0" tIns="0" rIns="0" bIns="0" rtlCol="0">
+                  <a:spAutoFit/>
+                </a:bodyPr>
+                <a:lstStyle/>
+                <a:p>
+                  <a:pPr/>
+                  <a14:m>
+                    <m:oMathPara xmlns:m="http://schemas.openxmlformats.org/officeDocument/2006/math">
+                      <m:oMathParaPr>
+                        <m:jc m:val="centerGroup"/>
+                      </m:oMathParaPr>
+                      <m:oMath xmlns:m="http://schemas.openxmlformats.org/officeDocument/2006/math">
+                        <m:r>
+                          <a:rPr kumimoji="1" lang="en-US" altLang="zh-CN" b="0" i="1" smtClean="0">
+                            <a:solidFill>
+                              <a:schemeClr val="tx1"/>
+                            </a:solidFill>
+                            <a:latin typeface="Cambria Math" panose="02040503050406030204" pitchFamily="18" charset="0"/>
+                          </a:rPr>
+                          <m:t>𝐴</m:t>
+                        </m:r>
+                      </m:oMath>
+                    </m:oMathPara>
+                  </a14:m>
+                  <a:endParaRPr kumimoji="1" lang="zh-CN" altLang="en-US" dirty="0">
+                    <a:solidFill>
+                      <a:schemeClr val="tx1"/>
+                    </a:solidFill>
+                  </a:endParaRPr>
+                </a:p>
+              </p:txBody>
+            </p:sp>
+          </mc:Choice>
+          <mc:Fallback>
+            <p:sp>
+              <p:nvSpPr>
+                <p:cNvPr id="11" name="文本框 10">
+                  <a:extLst>
+                    <a:ext uri="{FF2B5EF4-FFF2-40B4-BE49-F238E27FC236}">
+                      <a16:creationId xmlns:a16="http://schemas.microsoft.com/office/drawing/2014/main" id="{87AA86BD-7098-E248-91B1-6A90C45B0ACB}"/>
+                    </a:ext>
+                  </a:extLst>
+                </p:cNvPr>
+                <p:cNvSpPr txBox="1">
+                  <a:spLocks noRot="1" noChangeAspect="1" noMove="1" noResize="1" noEditPoints="1" noAdjustHandles="1" noChangeArrowheads="1" noChangeShapeType="1" noTextEdit="1"/>
+                </p:cNvSpPr>
+                <p:nvPr/>
+              </p:nvSpPr>
+              <p:spPr>
+                <a:xfrm>
+                  <a:off x="3266708" y="3748697"/>
+                  <a:ext cx="210635" cy="276999"/>
+                </a:xfrm>
+                <a:prstGeom prst="rect">
+                  <a:avLst/>
+                </a:prstGeom>
+                <a:blipFill>
+                  <a:blip r:embed="rId6"/>
+                  <a:stretch>
+                    <a:fillRect l="-16667" r="-16667" b="-4348"/>
+                  </a:stretch>
+                </a:blipFill>
+              </p:spPr>
+              <p:txBody>
+                <a:bodyPr/>
+                <a:lstStyle/>
+                <a:p>
+                  <a:r>
+                    <a:rPr lang="zh-CN" altLang="en-US">
+                      <a:noFill/>
+                    </a:rPr>
+                    <a:t> </a:t>
+                  </a:r>
+                </a:p>
+              </p:txBody>
+            </p:sp>
+          </mc:Fallback>
+        </mc:AlternateContent>
+        <mc:AlternateContent xmlns:mc="http://schemas.openxmlformats.org/markup-compatibility/2006">
+          <mc:Choice xmlns:a14="http://schemas.microsoft.com/office/drawing/2010/main" Requires="a14">
+            <p:sp>
+              <p:nvSpPr>
+                <p:cNvPr id="12" name="文本框 11">
+                  <a:extLst>
+                    <a:ext uri="{FF2B5EF4-FFF2-40B4-BE49-F238E27FC236}">
+                      <a16:creationId xmlns:a16="http://schemas.microsoft.com/office/drawing/2014/main" id="{2FD8EFDE-A984-6C40-BA67-CD8406F2D0AF}"/>
+                    </a:ext>
+                  </a:extLst>
+                </p:cNvPr>
+                <p:cNvSpPr txBox="1"/>
+                <p:nvPr/>
+              </p:nvSpPr>
+              <p:spPr>
+                <a:xfrm>
+                  <a:off x="6273722" y="3053477"/>
+                  <a:ext cx="1058174" cy="307777"/>
+                </a:xfrm>
+                <a:prstGeom prst="rect">
+                  <a:avLst/>
+                </a:prstGeom>
+                <a:noFill/>
+              </p:spPr>
+              <p:txBody>
+                <a:bodyPr wrap="none" lIns="0" tIns="0" rIns="0" bIns="0" rtlCol="0">
+                  <a:spAutoFit/>
+                </a:bodyPr>
+                <a:lstStyle/>
+                <a:p>
+                  <a:pPr/>
+                  <a14:m>
+                    <m:oMathPara xmlns:m="http://schemas.openxmlformats.org/officeDocument/2006/math">
+                      <m:oMathParaPr>
+                        <m:jc m:val="centerGroup"/>
+                      </m:oMathParaPr>
+                      <m:oMath xmlns:m="http://schemas.openxmlformats.org/officeDocument/2006/math">
+                        <m:r>
+                          <a:rPr kumimoji="1" lang="en-US" altLang="zh-CN" sz="2000" b="0" i="1" smtClean="0">
+                            <a:solidFill>
+                              <a:srgbClr val="4D6DA8"/>
+                            </a:solidFill>
+                            <a:latin typeface="Cambria Math" panose="02040503050406030204" pitchFamily="18" charset="0"/>
+                          </a:rPr>
+                          <m:t>𝑦</m:t>
+                        </m:r>
+                        <m:r>
+                          <a:rPr kumimoji="1" lang="en-US" altLang="zh-CN" sz="2000" b="0" i="1" smtClean="0">
+                            <a:solidFill>
+                              <a:srgbClr val="4D6DA8"/>
+                            </a:solidFill>
+                            <a:latin typeface="Cambria Math" panose="02040503050406030204" pitchFamily="18" charset="0"/>
+                          </a:rPr>
+                          <m:t>=</m:t>
+                        </m:r>
+                        <m:r>
+                          <a:rPr kumimoji="1" lang="en-US" altLang="zh-CN" sz="2000" b="0" i="1" smtClean="0">
+                            <a:solidFill>
+                              <a:srgbClr val="4D6DA8"/>
+                            </a:solidFill>
+                            <a:latin typeface="Cambria Math" panose="02040503050406030204" pitchFamily="18" charset="0"/>
+                          </a:rPr>
+                          <m:t>𝑓</m:t>
+                        </m:r>
+                        <m:r>
+                          <a:rPr kumimoji="1" lang="en-US" altLang="zh-CN" sz="2000" b="0" i="1" smtClean="0">
+                            <a:solidFill>
+                              <a:srgbClr val="4D6DA8"/>
+                            </a:solidFill>
+                            <a:latin typeface="Cambria Math" panose="02040503050406030204" pitchFamily="18" charset="0"/>
+                          </a:rPr>
+                          <m:t>(</m:t>
+                        </m:r>
+                        <m:r>
+                          <a:rPr kumimoji="1" lang="en-US" altLang="zh-CN" sz="2000" b="0" i="1" smtClean="0">
+                            <a:solidFill>
+                              <a:srgbClr val="4D6DA8"/>
+                            </a:solidFill>
+                            <a:latin typeface="Cambria Math" panose="02040503050406030204" pitchFamily="18" charset="0"/>
+                          </a:rPr>
+                          <m:t>𝑥</m:t>
+                        </m:r>
+                        <m:r>
+                          <a:rPr kumimoji="1" lang="en-US" altLang="zh-CN" sz="2000" b="0" i="1" smtClean="0">
+                            <a:solidFill>
+                              <a:srgbClr val="4D6DA8"/>
+                            </a:solidFill>
+                            <a:latin typeface="Cambria Math" panose="02040503050406030204" pitchFamily="18" charset="0"/>
+                          </a:rPr>
+                          <m:t>)</m:t>
+                        </m:r>
+                      </m:oMath>
+                    </m:oMathPara>
+                  </a14:m>
+                  <a:endParaRPr kumimoji="1" lang="zh-CN" altLang="en-US" sz="2000" dirty="0">
+                    <a:solidFill>
+                      <a:srgbClr val="4D6DA8"/>
+                    </a:solidFill>
+                  </a:endParaRPr>
+                </a:p>
+              </p:txBody>
+            </p:sp>
+          </mc:Choice>
+          <mc:Fallback>
+            <p:sp>
+              <p:nvSpPr>
+                <p:cNvPr id="12" name="文本框 11">
+                  <a:extLst>
+                    <a:ext uri="{FF2B5EF4-FFF2-40B4-BE49-F238E27FC236}">
+                      <a16:creationId xmlns:a16="http://schemas.microsoft.com/office/drawing/2014/main" id="{2FD8EFDE-A984-6C40-BA67-CD8406F2D0AF}"/>
+                    </a:ext>
+                  </a:extLst>
+                </p:cNvPr>
+                <p:cNvSpPr txBox="1">
+                  <a:spLocks noRot="1" noChangeAspect="1" noMove="1" noResize="1" noEditPoints="1" noAdjustHandles="1" noChangeArrowheads="1" noChangeShapeType="1" noTextEdit="1"/>
+                </p:cNvSpPr>
+                <p:nvPr/>
+              </p:nvSpPr>
+              <p:spPr>
+                <a:xfrm>
+                  <a:off x="6273722" y="3053477"/>
+                  <a:ext cx="1058174" cy="307777"/>
+                </a:xfrm>
+                <a:prstGeom prst="rect">
+                  <a:avLst/>
+                </a:prstGeom>
+                <a:blipFill>
+                  <a:blip r:embed="rId7"/>
+                  <a:stretch>
+                    <a:fillRect l="-3571" r="-7143" b="-28000"/>
+                  </a:stretch>
+                </a:blipFill>
+              </p:spPr>
+              <p:txBody>
+                <a:bodyPr/>
+                <a:lstStyle/>
+                <a:p>
+                  <a:r>
+                    <a:rPr lang="zh-CN" altLang="en-US">
+                      <a:noFill/>
+                    </a:rPr>
+                    <a:t> </a:t>
+                  </a:r>
+                </a:p>
+              </p:txBody>
+            </p:sp>
+          </mc:Fallback>
+        </mc:AlternateContent>
+        <mc:AlternateContent xmlns:mc="http://schemas.openxmlformats.org/markup-compatibility/2006">
+          <mc:Choice xmlns:a14="http://schemas.microsoft.com/office/drawing/2010/main" Requires="a14">
+            <p:sp>
+              <p:nvSpPr>
+                <p:cNvPr id="13" name="文本框 12">
+                  <a:extLst>
+                    <a:ext uri="{FF2B5EF4-FFF2-40B4-BE49-F238E27FC236}">
+                      <a16:creationId xmlns:a16="http://schemas.microsoft.com/office/drawing/2014/main" id="{42717BE5-F18B-2044-AA84-CCB828B1F5F5}"/>
+                    </a:ext>
+                  </a:extLst>
+                </p:cNvPr>
+                <p:cNvSpPr txBox="1"/>
+                <p:nvPr/>
+              </p:nvSpPr>
+              <p:spPr>
+                <a:xfrm>
+                  <a:off x="6273722" y="3895456"/>
+                  <a:ext cx="2203104" cy="336374"/>
+                </a:xfrm>
+                <a:prstGeom prst="rect">
+                  <a:avLst/>
+                </a:prstGeom>
+                <a:noFill/>
+              </p:spPr>
+              <p:txBody>
+                <a:bodyPr wrap="none" lIns="0" tIns="0" rIns="0" bIns="0" rtlCol="0">
+                  <a:spAutoFit/>
+                </a:bodyPr>
+                <a:lstStyle/>
+                <a:p>
+                  <a:pPr/>
+                  <a14:m>
+                    <m:oMathPara xmlns:m="http://schemas.openxmlformats.org/officeDocument/2006/math">
+                      <m:oMathParaPr>
+                        <m:jc m:val="centerGroup"/>
+                      </m:oMathParaPr>
+                      <m:oMath xmlns:m="http://schemas.openxmlformats.org/officeDocument/2006/math">
+                        <m:sSub>
+                          <m:sSubPr>
+                            <m:ctrlPr>
+                              <a:rPr kumimoji="1" lang="en-US" altLang="zh-CN" sz="2000" b="0" i="1" smtClean="0">
+                                <a:solidFill>
+                                  <a:srgbClr val="FF0000"/>
+                                </a:solidFill>
+                                <a:latin typeface="Cambria Math" panose="02040503050406030204" pitchFamily="18" charset="0"/>
+                              </a:rPr>
+                            </m:ctrlPr>
+                          </m:sSubPr>
+                          <m:e>
+                            <m:r>
+                              <a:rPr kumimoji="1" lang="en-US" altLang="zh-CN" sz="2000" b="0" i="1" smtClean="0">
+                                <a:solidFill>
+                                  <a:srgbClr val="FF0000"/>
+                                </a:solidFill>
+                                <a:latin typeface="Cambria Math" panose="02040503050406030204" pitchFamily="18" charset="0"/>
+                              </a:rPr>
+                              <m:t>𝑥</m:t>
+                            </m:r>
+                          </m:e>
+                          <m:sub>
+                            <m:sSub>
+                              <m:sSubPr>
+                                <m:ctrlPr>
+                                  <a:rPr kumimoji="1" lang="en-US" altLang="zh-CN" sz="2000" b="0" i="1" smtClean="0">
+                                    <a:solidFill>
+                                      <a:srgbClr val="FF0000"/>
+                                    </a:solidFill>
+                                    <a:latin typeface="Cambria Math" panose="02040503050406030204" pitchFamily="18" charset="0"/>
+                                  </a:rPr>
+                                </m:ctrlPr>
+                              </m:sSubPr>
+                              <m:e>
+                                <m:r>
+                                  <a:rPr kumimoji="1" lang="en-US" altLang="zh-CN" sz="2000" b="0" i="1" smtClean="0">
+                                    <a:solidFill>
+                                      <a:srgbClr val="FF0000"/>
+                                    </a:solidFill>
+                                    <a:latin typeface="Cambria Math" panose="02040503050406030204" pitchFamily="18" charset="0"/>
+                                  </a:rPr>
+                                  <m:t>𝑛</m:t>
+                                </m:r>
+                              </m:e>
+                              <m:sub>
+                                <m:r>
+                                  <a:rPr kumimoji="1" lang="en-US" altLang="zh-CN" sz="2000" b="0" i="1" smtClean="0">
+                                    <a:solidFill>
+                                      <a:srgbClr val="FF0000"/>
+                                    </a:solidFill>
+                                    <a:latin typeface="Cambria Math" panose="02040503050406030204" pitchFamily="18" charset="0"/>
+                                  </a:rPr>
+                                  <m:t>𝑘</m:t>
+                                </m:r>
+                              </m:sub>
+                            </m:sSub>
+                          </m:sub>
+                        </m:sSub>
+                        <m:r>
+                          <a:rPr kumimoji="1" lang="en-US" altLang="zh-CN" sz="2000" b="0" i="1" smtClean="0">
+                            <a:solidFill>
+                              <a:srgbClr val="FF0000"/>
+                            </a:solidFill>
+                            <a:latin typeface="Cambria Math" panose="02040503050406030204" pitchFamily="18" charset="0"/>
+                          </a:rPr>
+                          <m:t>→+∞ (</m:t>
+                        </m:r>
+                        <m:r>
+                          <a:rPr kumimoji="1" lang="en-US" altLang="zh-CN" sz="2000" b="0" i="1" smtClean="0">
+                            <a:solidFill>
+                              <a:srgbClr val="FF0000"/>
+                            </a:solidFill>
+                            <a:latin typeface="Cambria Math" panose="02040503050406030204" pitchFamily="18" charset="0"/>
+                          </a:rPr>
+                          <m:t>𝑘</m:t>
+                        </m:r>
+                        <m:r>
+                          <a:rPr kumimoji="1" lang="en-US" altLang="zh-CN" sz="2000" b="0" i="1" smtClean="0">
+                            <a:solidFill>
+                              <a:srgbClr val="FF0000"/>
+                            </a:solidFill>
+                            <a:latin typeface="Cambria Math" panose="02040503050406030204" pitchFamily="18" charset="0"/>
+                          </a:rPr>
+                          <m:t>→∞)</m:t>
+                        </m:r>
+                      </m:oMath>
+                    </m:oMathPara>
+                  </a14:m>
+                  <a:endParaRPr kumimoji="1" lang="zh-CN" altLang="en-US" sz="2000" dirty="0">
+                    <a:solidFill>
+                      <a:srgbClr val="FF0000"/>
+                    </a:solidFill>
+                  </a:endParaRPr>
+                </a:p>
+              </p:txBody>
+            </p:sp>
+          </mc:Choice>
+          <mc:Fallback>
+            <p:sp>
+              <p:nvSpPr>
+                <p:cNvPr id="13" name="文本框 12">
+                  <a:extLst>
+                    <a:ext uri="{FF2B5EF4-FFF2-40B4-BE49-F238E27FC236}">
+                      <a16:creationId xmlns:a16="http://schemas.microsoft.com/office/drawing/2014/main" id="{42717BE5-F18B-2044-AA84-CCB828B1F5F5}"/>
+                    </a:ext>
+                  </a:extLst>
+                </p:cNvPr>
+                <p:cNvSpPr txBox="1">
+                  <a:spLocks noRot="1" noChangeAspect="1" noMove="1" noResize="1" noEditPoints="1" noAdjustHandles="1" noChangeArrowheads="1" noChangeShapeType="1" noTextEdit="1"/>
+                </p:cNvSpPr>
+                <p:nvPr/>
+              </p:nvSpPr>
+              <p:spPr>
+                <a:xfrm>
+                  <a:off x="6273722" y="3895456"/>
+                  <a:ext cx="2203104" cy="336374"/>
+                </a:xfrm>
+                <a:prstGeom prst="rect">
+                  <a:avLst/>
+                </a:prstGeom>
+                <a:blipFill>
+                  <a:blip r:embed="rId8"/>
+                  <a:stretch>
+                    <a:fillRect l="-575" t="-7407" r="-2874" b="-25926"/>
+                  </a:stretch>
+                </a:blipFill>
+              </p:spPr>
+              <p:txBody>
+                <a:bodyPr/>
+                <a:lstStyle/>
+                <a:p>
+                  <a:r>
+                    <a:rPr lang="zh-CN" altLang="en-US">
+                      <a:noFill/>
+                    </a:rPr>
+                    <a:t> </a:t>
+                  </a:r>
+                </a:p>
+              </p:txBody>
+            </p:sp>
+          </mc:Fallback>
+        </mc:AlternateContent>
+      </p:grpSp>
+    </p:spTree>
+    <p:extLst>
+      <p:ext uri="{BB962C8B-B14F-4D97-AF65-F5344CB8AC3E}">
+        <p14:creationId xmlns:p14="http://schemas.microsoft.com/office/powerpoint/2010/main" val="4180310473"/>
+      </p:ext>
+    </p:extLst>
+  </p:cSld>
+  <p:clrMapOvr>
+    <a:masterClrMapping/>
+  </p:clrMapOvr>
+</p:sld>
+</file>
+
+<file path=ppt/slides/slide41.xml><?xml version="1.0" encoding="utf-8"?>
+<p:sld xmlns:a="http://schemas.openxmlformats.org/drawingml/2006/main" xmlns:r="http://schemas.openxmlformats.org/officeDocument/2006/relationships" xmlns:p="http://schemas.openxmlformats.org/presentationml/2006/main">
+  <p:cSld>
+    <p:spTree>
+      <p:nvGrpSpPr>
+        <p:cNvPr id="1" name=""/>
+        <p:cNvGrpSpPr/>
+        <p:nvPr/>
+      </p:nvGrpSpPr>
+      <p:grpSpPr>
+        <a:xfrm>
+          <a:off x="0" y="0"/>
+          <a:ext cx="0" cy="0"/>
+          <a:chOff x="0" y="0"/>
+          <a:chExt cx="0" cy="0"/>
+        </a:xfrm>
+      </p:grpSpPr>
+      <p:grpSp>
+        <p:nvGrpSpPr>
+          <p:cNvPr id="18" name="组合 17">
+            <a:extLst>
+              <a:ext uri="{FF2B5EF4-FFF2-40B4-BE49-F238E27FC236}">
+                <a16:creationId xmlns:a16="http://schemas.microsoft.com/office/drawing/2014/main" id="{5C89FAC5-C030-0F4D-9871-9AB71AFA87A5}"/>
+              </a:ext>
+            </a:extLst>
+          </p:cNvPr>
+          <p:cNvGrpSpPr/>
+          <p:nvPr/>
+        </p:nvGrpSpPr>
+        <p:grpSpPr>
+          <a:xfrm>
+            <a:off x="3225800" y="1651000"/>
+            <a:ext cx="5740400" cy="3664868"/>
+            <a:chOff x="3225800" y="1651000"/>
+            <a:chExt cx="5740400" cy="3664868"/>
+          </a:xfrm>
+        </p:grpSpPr>
+        <p:pic>
+          <p:nvPicPr>
+            <p:cNvPr id="5" name="图片 4">
+              <a:extLst>
+                <a:ext uri="{FF2B5EF4-FFF2-40B4-BE49-F238E27FC236}">
+                  <a16:creationId xmlns:a16="http://schemas.microsoft.com/office/drawing/2014/main" id="{8D07EB1B-2E0A-D440-BC42-8960B0EEE7FE}"/>
+                </a:ext>
+              </a:extLst>
+            </p:cNvPr>
+            <p:cNvPicPr>
+              <a:picLocks noChangeAspect="1"/>
+            </p:cNvPicPr>
+            <p:nvPr/>
+          </p:nvPicPr>
+          <p:blipFill>
+            <a:blip r:embed="rId2"/>
+            <a:stretch>
+              <a:fillRect/>
+            </a:stretch>
+          </p:blipFill>
+          <p:spPr>
+            <a:xfrm>
+              <a:off x="3225800" y="1651000"/>
+              <a:ext cx="5740400" cy="3556000"/>
+            </a:xfrm>
+            <a:prstGeom prst="rect">
+              <a:avLst/>
+            </a:prstGeom>
+          </p:spPr>
+        </p:pic>
+        <p:cxnSp>
+          <p:nvCxnSpPr>
+            <p:cNvPr id="8" name="直线箭头连接符 7">
+              <a:extLst>
+                <a:ext uri="{FF2B5EF4-FFF2-40B4-BE49-F238E27FC236}">
+                  <a16:creationId xmlns:a16="http://schemas.microsoft.com/office/drawing/2014/main" id="{FCA50DD0-347A-F242-B821-4B39700E6C37}"/>
+                </a:ext>
+              </a:extLst>
+            </p:cNvPr>
+            <p:cNvCxnSpPr>
+              <a:cxnSpLocks/>
+            </p:cNvCxnSpPr>
+            <p:nvPr/>
+          </p:nvCxnSpPr>
+          <p:spPr>
+            <a:xfrm>
+              <a:off x="3266708" y="4989262"/>
+              <a:ext cx="5586132" cy="0"/>
+            </a:xfrm>
+            <a:prstGeom prst="straightConnector1">
+              <a:avLst/>
+            </a:prstGeom>
+            <a:ln>
+              <a:solidFill>
+                <a:schemeClr val="tx1"/>
+              </a:solidFill>
+              <a:tailEnd type="triangle"/>
+            </a:ln>
+          </p:spPr>
+          <p:style>
+            <a:lnRef idx="1">
+              <a:schemeClr val="accent1"/>
+            </a:lnRef>
+            <a:fillRef idx="0">
+              <a:schemeClr val="accent1"/>
+            </a:fillRef>
+            <a:effectRef idx="0">
+              <a:schemeClr val="accent1"/>
+            </a:effectRef>
+            <a:fontRef idx="minor">
+              <a:schemeClr val="tx1"/>
+            </a:fontRef>
+          </p:style>
+        </p:cxnSp>
+        <p:cxnSp>
+          <p:nvCxnSpPr>
+            <p:cNvPr id="9" name="直线箭头连接符 8">
+              <a:extLst>
+                <a:ext uri="{FF2B5EF4-FFF2-40B4-BE49-F238E27FC236}">
+                  <a16:creationId xmlns:a16="http://schemas.microsoft.com/office/drawing/2014/main" id="{F3C9B9E7-1B5F-0C4F-AEE4-D5E9160E6724}"/>
+                </a:ext>
+              </a:extLst>
+            </p:cNvPr>
+            <p:cNvCxnSpPr>
+              <a:cxnSpLocks/>
+            </p:cNvCxnSpPr>
+            <p:nvPr/>
+          </p:nvCxnSpPr>
+          <p:spPr>
+            <a:xfrm flipV="1">
+              <a:off x="3517485" y="1720850"/>
+              <a:ext cx="0" cy="3486150"/>
+            </a:xfrm>
+            <a:prstGeom prst="straightConnector1">
+              <a:avLst/>
+            </a:prstGeom>
+            <a:ln>
+              <a:solidFill>
+                <a:schemeClr val="tx1"/>
+              </a:solidFill>
+              <a:tailEnd type="triangle"/>
+            </a:ln>
+          </p:spPr>
+          <p:style>
+            <a:lnRef idx="1">
+              <a:schemeClr val="accent1"/>
+            </a:lnRef>
+            <a:fillRef idx="0">
+              <a:schemeClr val="accent1"/>
+            </a:fillRef>
+            <a:effectRef idx="0">
+              <a:schemeClr val="accent1"/>
+            </a:effectRef>
+            <a:fontRef idx="minor">
+              <a:schemeClr val="tx1"/>
+            </a:fontRef>
+          </p:style>
+        </p:cxnSp>
+        <mc:AlternateContent xmlns:mc="http://schemas.openxmlformats.org/markup-compatibility/2006">
+          <mc:Choice xmlns:a14="http://schemas.microsoft.com/office/drawing/2010/main" Requires="a14">
+            <p:sp>
+              <p:nvSpPr>
+                <p:cNvPr id="10" name="文本框 9">
+                  <a:extLst>
+                    <a:ext uri="{FF2B5EF4-FFF2-40B4-BE49-F238E27FC236}">
+                      <a16:creationId xmlns:a16="http://schemas.microsoft.com/office/drawing/2014/main" id="{C4F78963-3462-4148-8DD0-610A0EB64CB1}"/>
+                    </a:ext>
+                  </a:extLst>
+                </p:cNvPr>
+                <p:cNvSpPr txBox="1"/>
+                <p:nvPr/>
+              </p:nvSpPr>
+              <p:spPr>
+                <a:xfrm>
+                  <a:off x="3260199" y="4989262"/>
+                  <a:ext cx="223651" cy="276999"/>
+                </a:xfrm>
+                <a:prstGeom prst="rect">
+                  <a:avLst/>
+                </a:prstGeom>
+                <a:noFill/>
+              </p:spPr>
+              <p:txBody>
+                <a:bodyPr wrap="none" lIns="0" tIns="0" rIns="0" bIns="0" rtlCol="0">
+                  <a:spAutoFit/>
+                </a:bodyPr>
+                <a:lstStyle/>
+                <a:p>
+                  <a:pPr/>
+                  <a14:m>
+                    <m:oMathPara xmlns:m="http://schemas.openxmlformats.org/officeDocument/2006/math">
+                      <m:oMathParaPr>
+                        <m:jc m:val="centerGroup"/>
+                      </m:oMathParaPr>
+                      <m:oMath xmlns:m="http://schemas.openxmlformats.org/officeDocument/2006/math">
+                        <m:r>
+                          <a:rPr kumimoji="1" lang="en-US" altLang="zh-CN" b="0" i="1" smtClean="0">
+                            <a:solidFill>
+                              <a:schemeClr val="tx1"/>
+                            </a:solidFill>
+                            <a:latin typeface="Cambria Math" panose="02040503050406030204" pitchFamily="18" charset="0"/>
+                          </a:rPr>
+                          <m:t>𝑂</m:t>
+                        </m:r>
+                      </m:oMath>
+                    </m:oMathPara>
+                  </a14:m>
+                  <a:endParaRPr kumimoji="1" lang="zh-CN" altLang="en-US" dirty="0">
+                    <a:solidFill>
+                      <a:schemeClr val="tx1"/>
+                    </a:solidFill>
+                  </a:endParaRPr>
+                </a:p>
+              </p:txBody>
+            </p:sp>
+          </mc:Choice>
+          <mc:Fallback>
+            <p:sp>
+              <p:nvSpPr>
+                <p:cNvPr id="10" name="文本框 9">
+                  <a:extLst>
+                    <a:ext uri="{FF2B5EF4-FFF2-40B4-BE49-F238E27FC236}">
+                      <a16:creationId xmlns:a16="http://schemas.microsoft.com/office/drawing/2014/main" id="{C4F78963-3462-4148-8DD0-610A0EB64CB1}"/>
+                    </a:ext>
+                  </a:extLst>
+                </p:cNvPr>
+                <p:cNvSpPr txBox="1">
+                  <a:spLocks noRot="1" noChangeAspect="1" noMove="1" noResize="1" noEditPoints="1" noAdjustHandles="1" noChangeArrowheads="1" noChangeShapeType="1" noTextEdit="1"/>
+                </p:cNvSpPr>
+                <p:nvPr/>
+              </p:nvSpPr>
+              <p:spPr>
+                <a:xfrm>
+                  <a:off x="3260199" y="4989262"/>
+                  <a:ext cx="223651" cy="276999"/>
+                </a:xfrm>
+                <a:prstGeom prst="rect">
+                  <a:avLst/>
+                </a:prstGeom>
+                <a:blipFill>
+                  <a:blip r:embed="rId3"/>
+                  <a:stretch>
+                    <a:fillRect l="-22222" r="-16667" b="-4348"/>
+                  </a:stretch>
+                </a:blipFill>
+              </p:spPr>
+              <p:txBody>
+                <a:bodyPr/>
+                <a:lstStyle/>
+                <a:p>
+                  <a:r>
+                    <a:rPr lang="zh-CN" altLang="en-US">
+                      <a:noFill/>
+                    </a:rPr>
+                    <a:t> </a:t>
+                  </a:r>
+                </a:p>
+              </p:txBody>
+            </p:sp>
+          </mc:Fallback>
+        </mc:AlternateContent>
+        <mc:AlternateContent xmlns:mc="http://schemas.openxmlformats.org/markup-compatibility/2006">
+          <mc:Choice xmlns:a14="http://schemas.microsoft.com/office/drawing/2010/main" Requires="a14">
+            <p:sp>
+              <p:nvSpPr>
+                <p:cNvPr id="11" name="文本框 10">
+                  <a:extLst>
+                    <a:ext uri="{FF2B5EF4-FFF2-40B4-BE49-F238E27FC236}">
+                      <a16:creationId xmlns:a16="http://schemas.microsoft.com/office/drawing/2014/main" id="{922A4FF4-BCA7-D44D-B918-9E281FD927D9}"/>
+                    </a:ext>
+                  </a:extLst>
+                </p:cNvPr>
+                <p:cNvSpPr txBox="1"/>
+                <p:nvPr/>
+              </p:nvSpPr>
+              <p:spPr>
+                <a:xfrm>
+                  <a:off x="8574314" y="4681694"/>
+                  <a:ext cx="192938" cy="276999"/>
+                </a:xfrm>
+                <a:prstGeom prst="rect">
+                  <a:avLst/>
+                </a:prstGeom>
+                <a:noFill/>
+              </p:spPr>
+              <p:txBody>
+                <a:bodyPr wrap="none" lIns="0" tIns="0" rIns="0" bIns="0" rtlCol="0">
+                  <a:spAutoFit/>
+                </a:bodyPr>
+                <a:lstStyle/>
+                <a:p>
+                  <a:pPr/>
+                  <a14:m>
+                    <m:oMathPara xmlns:m="http://schemas.openxmlformats.org/officeDocument/2006/math">
+                      <m:oMathParaPr>
+                        <m:jc m:val="centerGroup"/>
+                      </m:oMathParaPr>
+                      <m:oMath xmlns:m="http://schemas.openxmlformats.org/officeDocument/2006/math">
+                        <m:r>
+                          <a:rPr kumimoji="1" lang="en-US" altLang="zh-CN" b="0" i="1" smtClean="0">
+                            <a:solidFill>
+                              <a:schemeClr val="tx1"/>
+                            </a:solidFill>
+                            <a:latin typeface="Cambria Math" panose="02040503050406030204" pitchFamily="18" charset="0"/>
+                          </a:rPr>
+                          <m:t>𝑥</m:t>
+                        </m:r>
+                      </m:oMath>
+                    </m:oMathPara>
+                  </a14:m>
+                  <a:endParaRPr kumimoji="1" lang="zh-CN" altLang="en-US" dirty="0">
+                    <a:solidFill>
+                      <a:schemeClr val="tx1"/>
+                    </a:solidFill>
+                  </a:endParaRPr>
+                </a:p>
+              </p:txBody>
+            </p:sp>
+          </mc:Choice>
+          <mc:Fallback>
+            <p:sp>
+              <p:nvSpPr>
+                <p:cNvPr id="11" name="文本框 10">
+                  <a:extLst>
+                    <a:ext uri="{FF2B5EF4-FFF2-40B4-BE49-F238E27FC236}">
+                      <a16:creationId xmlns:a16="http://schemas.microsoft.com/office/drawing/2014/main" id="{922A4FF4-BCA7-D44D-B918-9E281FD927D9}"/>
+                    </a:ext>
+                  </a:extLst>
+                </p:cNvPr>
+                <p:cNvSpPr txBox="1">
+                  <a:spLocks noRot="1" noChangeAspect="1" noMove="1" noResize="1" noEditPoints="1" noAdjustHandles="1" noChangeArrowheads="1" noChangeShapeType="1" noTextEdit="1"/>
+                </p:cNvSpPr>
+                <p:nvPr/>
+              </p:nvSpPr>
+              <p:spPr>
+                <a:xfrm>
+                  <a:off x="8574314" y="4681694"/>
+                  <a:ext cx="192938" cy="276999"/>
+                </a:xfrm>
+                <a:prstGeom prst="rect">
+                  <a:avLst/>
+                </a:prstGeom>
+                <a:blipFill>
+                  <a:blip r:embed="rId4"/>
+                  <a:stretch>
+                    <a:fillRect l="-12500" r="-12500"/>
+                  </a:stretch>
+                </a:blipFill>
+              </p:spPr>
+              <p:txBody>
+                <a:bodyPr/>
+                <a:lstStyle/>
+                <a:p>
+                  <a:r>
+                    <a:rPr lang="zh-CN" altLang="en-US">
+                      <a:noFill/>
+                    </a:rPr>
+                    <a:t> </a:t>
+                  </a:r>
+                </a:p>
+              </p:txBody>
+            </p:sp>
+          </mc:Fallback>
+        </mc:AlternateContent>
+        <mc:AlternateContent xmlns:mc="http://schemas.openxmlformats.org/markup-compatibility/2006">
+          <mc:Choice xmlns:a14="http://schemas.microsoft.com/office/drawing/2010/main" Requires="a14">
+            <p:sp>
+              <p:nvSpPr>
+                <p:cNvPr id="12" name="文本框 11">
+                  <a:extLst>
+                    <a:ext uri="{FF2B5EF4-FFF2-40B4-BE49-F238E27FC236}">
+                      <a16:creationId xmlns:a16="http://schemas.microsoft.com/office/drawing/2014/main" id="{B3AE105C-9C00-A64E-88FE-DBACDF79A263}"/>
+                    </a:ext>
+                  </a:extLst>
+                </p:cNvPr>
+                <p:cNvSpPr txBox="1"/>
+                <p:nvPr/>
+              </p:nvSpPr>
+              <p:spPr>
+                <a:xfrm>
+                  <a:off x="3266708" y="1707617"/>
+                  <a:ext cx="196336" cy="276999"/>
+                </a:xfrm>
+                <a:prstGeom prst="rect">
+                  <a:avLst/>
+                </a:prstGeom>
+                <a:noFill/>
+              </p:spPr>
+              <p:txBody>
+                <a:bodyPr wrap="none" lIns="0" tIns="0" rIns="0" bIns="0" rtlCol="0">
+                  <a:spAutoFit/>
+                </a:bodyPr>
+                <a:lstStyle/>
+                <a:p>
+                  <a:pPr/>
+                  <a14:m>
+                    <m:oMathPara xmlns:m="http://schemas.openxmlformats.org/officeDocument/2006/math">
+                      <m:oMathParaPr>
+                        <m:jc m:val="centerGroup"/>
+                      </m:oMathParaPr>
+                      <m:oMath xmlns:m="http://schemas.openxmlformats.org/officeDocument/2006/math">
+                        <m:r>
+                          <a:rPr kumimoji="1" lang="en-US" altLang="zh-CN" b="0" i="1" smtClean="0">
+                            <a:solidFill>
+                              <a:schemeClr val="tx1"/>
+                            </a:solidFill>
+                            <a:latin typeface="Cambria Math" panose="02040503050406030204" pitchFamily="18" charset="0"/>
+                          </a:rPr>
+                          <m:t>𝑦</m:t>
+                        </m:r>
+                      </m:oMath>
+                    </m:oMathPara>
+                  </a14:m>
+                  <a:endParaRPr kumimoji="1" lang="zh-CN" altLang="en-US" dirty="0">
+                    <a:solidFill>
+                      <a:schemeClr val="tx1"/>
+                    </a:solidFill>
+                  </a:endParaRPr>
+                </a:p>
+              </p:txBody>
+            </p:sp>
+          </mc:Choice>
+          <mc:Fallback>
+            <p:sp>
+              <p:nvSpPr>
+                <p:cNvPr id="12" name="文本框 11">
+                  <a:extLst>
+                    <a:ext uri="{FF2B5EF4-FFF2-40B4-BE49-F238E27FC236}">
+                      <a16:creationId xmlns:a16="http://schemas.microsoft.com/office/drawing/2014/main" id="{B3AE105C-9C00-A64E-88FE-DBACDF79A263}"/>
+                    </a:ext>
+                  </a:extLst>
+                </p:cNvPr>
+                <p:cNvSpPr txBox="1">
+                  <a:spLocks noRot="1" noChangeAspect="1" noMove="1" noResize="1" noEditPoints="1" noAdjustHandles="1" noChangeArrowheads="1" noChangeShapeType="1" noTextEdit="1"/>
+                </p:cNvSpPr>
+                <p:nvPr/>
+              </p:nvSpPr>
+              <p:spPr>
+                <a:xfrm>
+                  <a:off x="3266708" y="1707617"/>
+                  <a:ext cx="196336" cy="276999"/>
+                </a:xfrm>
+                <a:prstGeom prst="rect">
+                  <a:avLst/>
+                </a:prstGeom>
+                <a:blipFill>
+                  <a:blip r:embed="rId5"/>
+                  <a:stretch>
+                    <a:fillRect l="-23529" r="-17647" b="-26087"/>
+                  </a:stretch>
+                </a:blipFill>
+              </p:spPr>
+              <p:txBody>
+                <a:bodyPr/>
+                <a:lstStyle/>
+                <a:p>
+                  <a:r>
+                    <a:rPr lang="zh-CN" altLang="en-US">
+                      <a:noFill/>
+                    </a:rPr>
+                    <a:t> </a:t>
+                  </a:r>
+                </a:p>
+              </p:txBody>
+            </p:sp>
+          </mc:Fallback>
+        </mc:AlternateContent>
+        <mc:AlternateContent xmlns:mc="http://schemas.openxmlformats.org/markup-compatibility/2006">
+          <mc:Choice xmlns:a14="http://schemas.microsoft.com/office/drawing/2010/main" Requires="a14">
+            <p:sp>
+              <p:nvSpPr>
+                <p:cNvPr id="13" name="文本框 12">
+                  <a:extLst>
+                    <a:ext uri="{FF2B5EF4-FFF2-40B4-BE49-F238E27FC236}">
+                      <a16:creationId xmlns:a16="http://schemas.microsoft.com/office/drawing/2014/main" id="{11611200-FE49-304F-881D-FEC955418680}"/>
+                    </a:ext>
+                  </a:extLst>
+                </p:cNvPr>
+                <p:cNvSpPr txBox="1"/>
+                <p:nvPr/>
+              </p:nvSpPr>
+              <p:spPr>
+                <a:xfrm>
+                  <a:off x="3253272" y="3623641"/>
+                  <a:ext cx="210635" cy="276999"/>
+                </a:xfrm>
+                <a:prstGeom prst="rect">
+                  <a:avLst/>
+                </a:prstGeom>
+                <a:noFill/>
+              </p:spPr>
+              <p:txBody>
+                <a:bodyPr wrap="none" lIns="0" tIns="0" rIns="0" bIns="0" rtlCol="0">
+                  <a:spAutoFit/>
+                </a:bodyPr>
+                <a:lstStyle/>
+                <a:p>
+                  <a:pPr/>
+                  <a14:m>
+                    <m:oMathPara xmlns:m="http://schemas.openxmlformats.org/officeDocument/2006/math">
+                      <m:oMathParaPr>
+                        <m:jc m:val="centerGroup"/>
+                      </m:oMathParaPr>
+                      <m:oMath xmlns:m="http://schemas.openxmlformats.org/officeDocument/2006/math">
+                        <m:r>
+                          <a:rPr kumimoji="1" lang="en-US" altLang="zh-CN" b="0" i="1" smtClean="0">
+                            <a:solidFill>
+                              <a:schemeClr val="tx1"/>
+                            </a:solidFill>
+                            <a:latin typeface="Cambria Math" panose="02040503050406030204" pitchFamily="18" charset="0"/>
+                          </a:rPr>
+                          <m:t>𝐴</m:t>
+                        </m:r>
+                      </m:oMath>
+                    </m:oMathPara>
+                  </a14:m>
+                  <a:endParaRPr kumimoji="1" lang="zh-CN" altLang="en-US" dirty="0">
+                    <a:solidFill>
+                      <a:schemeClr val="tx1"/>
+                    </a:solidFill>
+                  </a:endParaRPr>
+                </a:p>
+              </p:txBody>
+            </p:sp>
+          </mc:Choice>
+          <mc:Fallback>
+            <p:sp>
+              <p:nvSpPr>
+                <p:cNvPr id="13" name="文本框 12">
+                  <a:extLst>
+                    <a:ext uri="{FF2B5EF4-FFF2-40B4-BE49-F238E27FC236}">
+                      <a16:creationId xmlns:a16="http://schemas.microsoft.com/office/drawing/2014/main" id="{11611200-FE49-304F-881D-FEC955418680}"/>
+                    </a:ext>
+                  </a:extLst>
+                </p:cNvPr>
+                <p:cNvSpPr txBox="1">
+                  <a:spLocks noRot="1" noChangeAspect="1" noMove="1" noResize="1" noEditPoints="1" noAdjustHandles="1" noChangeArrowheads="1" noChangeShapeType="1" noTextEdit="1"/>
+                </p:cNvSpPr>
+                <p:nvPr/>
+              </p:nvSpPr>
+              <p:spPr>
+                <a:xfrm>
+                  <a:off x="3253272" y="3623641"/>
+                  <a:ext cx="210635" cy="276999"/>
+                </a:xfrm>
+                <a:prstGeom prst="rect">
+                  <a:avLst/>
+                </a:prstGeom>
+                <a:blipFill>
+                  <a:blip r:embed="rId6"/>
+                  <a:stretch>
+                    <a:fillRect l="-16667" r="-16667" b="-4348"/>
+                  </a:stretch>
+                </a:blipFill>
+              </p:spPr>
+              <p:txBody>
+                <a:bodyPr/>
+                <a:lstStyle/>
+                <a:p>
+                  <a:r>
+                    <a:rPr lang="zh-CN" altLang="en-US">
+                      <a:noFill/>
+                    </a:rPr>
+                    <a:t> </a:t>
+                  </a:r>
+                </a:p>
+              </p:txBody>
+            </p:sp>
+          </mc:Fallback>
+        </mc:AlternateContent>
+        <mc:AlternateContent xmlns:mc="http://schemas.openxmlformats.org/markup-compatibility/2006">
+          <mc:Choice xmlns:a14="http://schemas.microsoft.com/office/drawing/2010/main" Requires="a14">
+            <p:sp>
+              <p:nvSpPr>
+                <p:cNvPr id="14" name="文本框 13">
+                  <a:extLst>
+                    <a:ext uri="{FF2B5EF4-FFF2-40B4-BE49-F238E27FC236}">
+                      <a16:creationId xmlns:a16="http://schemas.microsoft.com/office/drawing/2014/main" id="{7F01B5CD-43BC-FA46-9A72-888510DBEC3E}"/>
+                    </a:ext>
+                  </a:extLst>
+                </p:cNvPr>
+                <p:cNvSpPr txBox="1"/>
+                <p:nvPr/>
+              </p:nvSpPr>
+              <p:spPr>
+                <a:xfrm>
+                  <a:off x="6273722" y="3053477"/>
+                  <a:ext cx="1058174" cy="307777"/>
+                </a:xfrm>
+                <a:prstGeom prst="rect">
+                  <a:avLst/>
+                </a:prstGeom>
+                <a:noFill/>
+              </p:spPr>
+              <p:txBody>
+                <a:bodyPr wrap="none" lIns="0" tIns="0" rIns="0" bIns="0" rtlCol="0">
+                  <a:spAutoFit/>
+                </a:bodyPr>
+                <a:lstStyle/>
+                <a:p>
+                  <a:pPr/>
+                  <a14:m>
+                    <m:oMathPara xmlns:m="http://schemas.openxmlformats.org/officeDocument/2006/math">
+                      <m:oMathParaPr>
+                        <m:jc m:val="centerGroup"/>
+                      </m:oMathParaPr>
+                      <m:oMath xmlns:m="http://schemas.openxmlformats.org/officeDocument/2006/math">
+                        <m:r>
+                          <a:rPr kumimoji="1" lang="en-US" altLang="zh-CN" sz="2000" b="0" i="1" smtClean="0">
+                            <a:solidFill>
+                              <a:srgbClr val="4D6DA8"/>
+                            </a:solidFill>
+                            <a:latin typeface="Cambria Math" panose="02040503050406030204" pitchFamily="18" charset="0"/>
+                          </a:rPr>
+                          <m:t>𝑦</m:t>
+                        </m:r>
+                        <m:r>
+                          <a:rPr kumimoji="1" lang="en-US" altLang="zh-CN" sz="2000" b="0" i="1" smtClean="0">
+                            <a:solidFill>
+                              <a:srgbClr val="4D6DA8"/>
+                            </a:solidFill>
+                            <a:latin typeface="Cambria Math" panose="02040503050406030204" pitchFamily="18" charset="0"/>
+                          </a:rPr>
+                          <m:t>=</m:t>
+                        </m:r>
+                        <m:r>
+                          <a:rPr kumimoji="1" lang="en-US" altLang="zh-CN" sz="2000" b="0" i="1" smtClean="0">
+                            <a:solidFill>
+                              <a:srgbClr val="4D6DA8"/>
+                            </a:solidFill>
+                            <a:latin typeface="Cambria Math" panose="02040503050406030204" pitchFamily="18" charset="0"/>
+                          </a:rPr>
+                          <m:t>𝑓</m:t>
+                        </m:r>
+                        <m:r>
+                          <a:rPr kumimoji="1" lang="en-US" altLang="zh-CN" sz="2000" b="0" i="1" smtClean="0">
+                            <a:solidFill>
+                              <a:srgbClr val="4D6DA8"/>
+                            </a:solidFill>
+                            <a:latin typeface="Cambria Math" panose="02040503050406030204" pitchFamily="18" charset="0"/>
+                          </a:rPr>
+                          <m:t>(</m:t>
+                        </m:r>
+                        <m:r>
+                          <a:rPr kumimoji="1" lang="en-US" altLang="zh-CN" sz="2000" b="0" i="1" smtClean="0">
+                            <a:solidFill>
+                              <a:srgbClr val="4D6DA8"/>
+                            </a:solidFill>
+                            <a:latin typeface="Cambria Math" panose="02040503050406030204" pitchFamily="18" charset="0"/>
+                          </a:rPr>
+                          <m:t>𝑥</m:t>
+                        </m:r>
+                        <m:r>
+                          <a:rPr kumimoji="1" lang="en-US" altLang="zh-CN" sz="2000" b="0" i="1" smtClean="0">
+                            <a:solidFill>
+                              <a:srgbClr val="4D6DA8"/>
+                            </a:solidFill>
+                            <a:latin typeface="Cambria Math" panose="02040503050406030204" pitchFamily="18" charset="0"/>
+                          </a:rPr>
+                          <m:t>)</m:t>
+                        </m:r>
+                      </m:oMath>
+                    </m:oMathPara>
+                  </a14:m>
+                  <a:endParaRPr kumimoji="1" lang="zh-CN" altLang="en-US" sz="2000" dirty="0">
+                    <a:solidFill>
+                      <a:srgbClr val="4D6DA8"/>
+                    </a:solidFill>
+                  </a:endParaRPr>
+                </a:p>
+              </p:txBody>
+            </p:sp>
+          </mc:Choice>
+          <mc:Fallback>
+            <p:sp>
+              <p:nvSpPr>
+                <p:cNvPr id="14" name="文本框 13">
+                  <a:extLst>
+                    <a:ext uri="{FF2B5EF4-FFF2-40B4-BE49-F238E27FC236}">
+                      <a16:creationId xmlns:a16="http://schemas.microsoft.com/office/drawing/2014/main" id="{7F01B5CD-43BC-FA46-9A72-888510DBEC3E}"/>
+                    </a:ext>
+                  </a:extLst>
+                </p:cNvPr>
+                <p:cNvSpPr txBox="1">
+                  <a:spLocks noRot="1" noChangeAspect="1" noMove="1" noResize="1" noEditPoints="1" noAdjustHandles="1" noChangeArrowheads="1" noChangeShapeType="1" noTextEdit="1"/>
+                </p:cNvSpPr>
+                <p:nvPr/>
+              </p:nvSpPr>
+              <p:spPr>
+                <a:xfrm>
+                  <a:off x="6273722" y="3053477"/>
+                  <a:ext cx="1058174" cy="307777"/>
+                </a:xfrm>
+                <a:prstGeom prst="rect">
+                  <a:avLst/>
+                </a:prstGeom>
+                <a:blipFill>
+                  <a:blip r:embed="rId7"/>
+                  <a:stretch>
+                    <a:fillRect l="-3571" r="-7143" b="-28000"/>
+                  </a:stretch>
+                </a:blipFill>
+              </p:spPr>
+              <p:txBody>
+                <a:bodyPr/>
+                <a:lstStyle/>
+                <a:p>
+                  <a:r>
+                    <a:rPr lang="zh-CN" altLang="en-US">
+                      <a:noFill/>
+                    </a:rPr>
+                    <a:t> </a:t>
+                  </a:r>
+                </a:p>
+              </p:txBody>
+            </p:sp>
+          </mc:Fallback>
+        </mc:AlternateContent>
+        <mc:AlternateContent xmlns:mc="http://schemas.openxmlformats.org/markup-compatibility/2006">
+          <mc:Choice xmlns:a14="http://schemas.microsoft.com/office/drawing/2010/main" Requires="a14">
+            <p:sp>
+              <p:nvSpPr>
+                <p:cNvPr id="15" name="文本框 14">
+                  <a:extLst>
+                    <a:ext uri="{FF2B5EF4-FFF2-40B4-BE49-F238E27FC236}">
+                      <a16:creationId xmlns:a16="http://schemas.microsoft.com/office/drawing/2014/main" id="{3451BC58-8FAE-CF4E-9727-4FDB6DD17A2A}"/>
+                    </a:ext>
+                  </a:extLst>
+                </p:cNvPr>
+                <p:cNvSpPr txBox="1"/>
+                <p:nvPr/>
+              </p:nvSpPr>
+              <p:spPr>
+                <a:xfrm>
+                  <a:off x="5685813" y="4153116"/>
+                  <a:ext cx="1945469" cy="307777"/>
+                </a:xfrm>
+                <a:prstGeom prst="rect">
+                  <a:avLst/>
+                </a:prstGeom>
+                <a:noFill/>
+              </p:spPr>
+              <p:txBody>
+                <a:bodyPr wrap="none" lIns="0" tIns="0" rIns="0" bIns="0" rtlCol="0">
+                  <a:spAutoFit/>
+                </a:bodyPr>
+                <a:lstStyle/>
+                <a:p>
+                  <a:pPr/>
+                  <a14:m>
+                    <m:oMathPara xmlns:m="http://schemas.openxmlformats.org/officeDocument/2006/math">
+                      <m:oMathParaPr>
+                        <m:jc m:val="centerGroup"/>
+                      </m:oMathParaPr>
+                      <m:oMath xmlns:m="http://schemas.openxmlformats.org/officeDocument/2006/math">
+                        <m:sSub>
+                          <m:sSubPr>
+                            <m:ctrlPr>
+                              <a:rPr kumimoji="1" lang="en-US" altLang="zh-CN" sz="2000" b="0" i="1" smtClean="0">
+                                <a:solidFill>
+                                  <a:srgbClr val="FF0000"/>
+                                </a:solidFill>
+                                <a:latin typeface="Cambria Math" panose="02040503050406030204" pitchFamily="18" charset="0"/>
+                              </a:rPr>
+                            </m:ctrlPr>
+                          </m:sSubPr>
+                          <m:e>
+                            <m:r>
+                              <a:rPr kumimoji="1" lang="en-US" altLang="zh-CN" sz="2000" b="0" i="1" smtClean="0">
+                                <a:solidFill>
+                                  <a:srgbClr val="FF0000"/>
+                                </a:solidFill>
+                                <a:latin typeface="Cambria Math" panose="02040503050406030204" pitchFamily="18" charset="0"/>
+                              </a:rPr>
+                              <m:t>𝑥</m:t>
+                            </m:r>
+                          </m:e>
+                          <m:sub>
+                            <m:r>
+                              <a:rPr kumimoji="1" lang="en-US" altLang="zh-CN" sz="2000" b="0" i="1" smtClean="0">
+                                <a:solidFill>
+                                  <a:srgbClr val="FF0000"/>
+                                </a:solidFill>
+                                <a:latin typeface="Cambria Math" panose="02040503050406030204" pitchFamily="18" charset="0"/>
+                              </a:rPr>
+                              <m:t>𝑛</m:t>
+                            </m:r>
+                          </m:sub>
+                        </m:sSub>
+                        <m:r>
+                          <a:rPr kumimoji="1" lang="en-US" altLang="zh-CN" sz="2000" b="0" i="1" smtClean="0">
+                            <a:solidFill>
+                              <a:srgbClr val="FF0000"/>
+                            </a:solidFill>
+                            <a:latin typeface="Cambria Math" panose="02040503050406030204" pitchFamily="18" charset="0"/>
+                          </a:rPr>
+                          <m:t>→</m:t>
+                        </m:r>
+                        <m:sSub>
+                          <m:sSubPr>
+                            <m:ctrlPr>
+                              <a:rPr kumimoji="1" lang="en-US" altLang="zh-CN" sz="2000" b="0" i="1" smtClean="0">
+                                <a:solidFill>
+                                  <a:srgbClr val="FF0000"/>
+                                </a:solidFill>
+                                <a:latin typeface="Cambria Math" panose="02040503050406030204" pitchFamily="18" charset="0"/>
+                              </a:rPr>
+                            </m:ctrlPr>
+                          </m:sSubPr>
+                          <m:e>
+                            <m:r>
+                              <a:rPr kumimoji="1" lang="en-US" altLang="zh-CN" sz="2000" b="0" i="1" smtClean="0">
+                                <a:solidFill>
+                                  <a:srgbClr val="FF0000"/>
+                                </a:solidFill>
+                                <a:latin typeface="Cambria Math" panose="02040503050406030204" pitchFamily="18" charset="0"/>
+                              </a:rPr>
+                              <m:t>𝑥</m:t>
+                            </m:r>
+                          </m:e>
+                          <m:sub>
+                            <m:r>
+                              <a:rPr kumimoji="1" lang="en-US" altLang="zh-CN" sz="2000" b="0" i="1" smtClean="0">
+                                <a:solidFill>
+                                  <a:srgbClr val="FF0000"/>
+                                </a:solidFill>
+                                <a:latin typeface="Cambria Math" panose="02040503050406030204" pitchFamily="18" charset="0"/>
+                              </a:rPr>
+                              <m:t>0</m:t>
+                            </m:r>
+                          </m:sub>
+                        </m:sSub>
+                        <m:r>
+                          <a:rPr kumimoji="1" lang="en-US" altLang="zh-CN" sz="2000" b="0" i="1" smtClean="0">
+                            <a:solidFill>
+                              <a:srgbClr val="FF0000"/>
+                            </a:solidFill>
+                            <a:latin typeface="Cambria Math" panose="02040503050406030204" pitchFamily="18" charset="0"/>
+                          </a:rPr>
+                          <m:t> (</m:t>
+                        </m:r>
+                        <m:r>
+                          <a:rPr kumimoji="1" lang="en-US" altLang="zh-CN" sz="2000" b="0" i="1" smtClean="0">
+                            <a:solidFill>
+                              <a:srgbClr val="FF0000"/>
+                            </a:solidFill>
+                            <a:latin typeface="Cambria Math" panose="02040503050406030204" pitchFamily="18" charset="0"/>
+                          </a:rPr>
+                          <m:t>𝑛</m:t>
+                        </m:r>
+                        <m:r>
+                          <a:rPr kumimoji="1" lang="en-US" altLang="zh-CN" sz="2000" b="0" i="1" smtClean="0">
+                            <a:solidFill>
+                              <a:srgbClr val="FF0000"/>
+                            </a:solidFill>
+                            <a:latin typeface="Cambria Math" panose="02040503050406030204" pitchFamily="18" charset="0"/>
+                          </a:rPr>
+                          <m:t>→∞)</m:t>
+                        </m:r>
+                      </m:oMath>
+                    </m:oMathPara>
+                  </a14:m>
+                  <a:endParaRPr kumimoji="1" lang="zh-CN" altLang="en-US" sz="2000" dirty="0">
+                    <a:solidFill>
+                      <a:srgbClr val="FF0000"/>
+                    </a:solidFill>
+                  </a:endParaRPr>
+                </a:p>
+              </p:txBody>
+            </p:sp>
+          </mc:Choice>
+          <mc:Fallback>
+            <p:sp>
+              <p:nvSpPr>
+                <p:cNvPr id="15" name="文本框 14">
+                  <a:extLst>
+                    <a:ext uri="{FF2B5EF4-FFF2-40B4-BE49-F238E27FC236}">
+                      <a16:creationId xmlns:a16="http://schemas.microsoft.com/office/drawing/2014/main" id="{3451BC58-8FAE-CF4E-9727-4FDB6DD17A2A}"/>
+                    </a:ext>
+                  </a:extLst>
+                </p:cNvPr>
+                <p:cNvSpPr txBox="1">
+                  <a:spLocks noRot="1" noChangeAspect="1" noMove="1" noResize="1" noEditPoints="1" noAdjustHandles="1" noChangeArrowheads="1" noChangeShapeType="1" noTextEdit="1"/>
+                </p:cNvSpPr>
+                <p:nvPr/>
+              </p:nvSpPr>
+              <p:spPr>
+                <a:xfrm>
+                  <a:off x="5685813" y="4153116"/>
+                  <a:ext cx="1945469" cy="307777"/>
+                </a:xfrm>
+                <a:prstGeom prst="rect">
+                  <a:avLst/>
+                </a:prstGeom>
+                <a:blipFill>
+                  <a:blip r:embed="rId8"/>
+                  <a:stretch>
+                    <a:fillRect l="-1299" t="-4000" r="-3247" b="-36000"/>
+                  </a:stretch>
+                </a:blipFill>
+              </p:spPr>
+              <p:txBody>
+                <a:bodyPr/>
+                <a:lstStyle/>
+                <a:p>
+                  <a:r>
+                    <a:rPr lang="zh-CN" altLang="en-US">
+                      <a:noFill/>
+                    </a:rPr>
+                    <a:t> </a:t>
+                  </a:r>
+                </a:p>
+              </p:txBody>
+            </p:sp>
+          </mc:Fallback>
+        </mc:AlternateContent>
+        <mc:AlternateContent xmlns:mc="http://schemas.openxmlformats.org/markup-compatibility/2006">
+          <mc:Choice xmlns:a14="http://schemas.microsoft.com/office/drawing/2010/main" Requires="a14">
+            <p:sp>
+              <p:nvSpPr>
+                <p:cNvPr id="17" name="文本框 16">
+                  <a:extLst>
+                    <a:ext uri="{FF2B5EF4-FFF2-40B4-BE49-F238E27FC236}">
+                      <a16:creationId xmlns:a16="http://schemas.microsoft.com/office/drawing/2014/main" id="{095D4A36-783D-1646-8D44-D2D447C6A72A}"/>
+                    </a:ext>
+                  </a:extLst>
+                </p:cNvPr>
+                <p:cNvSpPr txBox="1"/>
+                <p:nvPr/>
+              </p:nvSpPr>
+              <p:spPr>
+                <a:xfrm>
+                  <a:off x="5443792" y="5038869"/>
+                  <a:ext cx="291042" cy="276999"/>
+                </a:xfrm>
+                <a:prstGeom prst="rect">
+                  <a:avLst/>
+                </a:prstGeom>
+                <a:noFill/>
+              </p:spPr>
+              <p:txBody>
+                <a:bodyPr wrap="none" lIns="0" tIns="0" rIns="0" bIns="0" rtlCol="0">
+                  <a:spAutoFit/>
+                </a:bodyPr>
+                <a:lstStyle/>
+                <a:p>
+                  <a:pPr/>
+                  <a14:m>
+                    <m:oMathPara xmlns:m="http://schemas.openxmlformats.org/officeDocument/2006/math">
+                      <m:oMathParaPr>
+                        <m:jc m:val="centerGroup"/>
+                      </m:oMathParaPr>
+                      <m:oMath xmlns:m="http://schemas.openxmlformats.org/officeDocument/2006/math">
+                        <m:sSub>
+                          <m:sSubPr>
+                            <m:ctrlPr>
+                              <a:rPr kumimoji="1" lang="en-US" altLang="zh-CN" b="0" i="1" smtClean="0">
+                                <a:solidFill>
+                                  <a:schemeClr val="tx1"/>
+                                </a:solidFill>
+                                <a:latin typeface="Cambria Math" panose="02040503050406030204" pitchFamily="18" charset="0"/>
+                              </a:rPr>
+                            </m:ctrlPr>
+                          </m:sSubPr>
+                          <m:e>
+                            <m:r>
+                              <a:rPr kumimoji="1" lang="en-US" altLang="zh-CN" b="0" i="1" smtClean="0">
+                                <a:solidFill>
+                                  <a:schemeClr val="tx1"/>
+                                </a:solidFill>
+                                <a:latin typeface="Cambria Math" panose="02040503050406030204" pitchFamily="18" charset="0"/>
+                              </a:rPr>
+                              <m:t>𝑥</m:t>
+                            </m:r>
+                          </m:e>
+                          <m:sub>
+                            <m:r>
+                              <a:rPr kumimoji="1" lang="en-US" altLang="zh-CN" b="0" i="1" smtClean="0">
+                                <a:solidFill>
+                                  <a:schemeClr val="tx1"/>
+                                </a:solidFill>
+                                <a:latin typeface="Cambria Math" panose="02040503050406030204" pitchFamily="18" charset="0"/>
+                              </a:rPr>
+                              <m:t>0</m:t>
+                            </m:r>
+                          </m:sub>
+                        </m:sSub>
+                      </m:oMath>
+                    </m:oMathPara>
+                  </a14:m>
+                  <a:endParaRPr kumimoji="1" lang="zh-CN" altLang="en-US" dirty="0">
+                    <a:solidFill>
+                      <a:schemeClr val="tx1"/>
+                    </a:solidFill>
+                  </a:endParaRPr>
+                </a:p>
+              </p:txBody>
+            </p:sp>
+          </mc:Choice>
+          <mc:Fallback>
+            <p:sp>
+              <p:nvSpPr>
+                <p:cNvPr id="17" name="文本框 16">
+                  <a:extLst>
+                    <a:ext uri="{FF2B5EF4-FFF2-40B4-BE49-F238E27FC236}">
+                      <a16:creationId xmlns:a16="http://schemas.microsoft.com/office/drawing/2014/main" id="{095D4A36-783D-1646-8D44-D2D447C6A72A}"/>
+                    </a:ext>
+                  </a:extLst>
+                </p:cNvPr>
+                <p:cNvSpPr txBox="1">
+                  <a:spLocks noRot="1" noChangeAspect="1" noMove="1" noResize="1" noEditPoints="1" noAdjustHandles="1" noChangeArrowheads="1" noChangeShapeType="1" noTextEdit="1"/>
+                </p:cNvSpPr>
+                <p:nvPr/>
+              </p:nvSpPr>
+              <p:spPr>
+                <a:xfrm>
+                  <a:off x="5443792" y="5038869"/>
+                  <a:ext cx="291042" cy="276999"/>
+                </a:xfrm>
+                <a:prstGeom prst="rect">
+                  <a:avLst/>
+                </a:prstGeom>
+                <a:blipFill>
+                  <a:blip r:embed="rId9"/>
+                  <a:stretch>
+                    <a:fillRect l="-8333" b="-8696"/>
+                  </a:stretch>
+                </a:blipFill>
+              </p:spPr>
+              <p:txBody>
+                <a:bodyPr/>
+                <a:lstStyle/>
+                <a:p>
+                  <a:r>
+                    <a:rPr lang="zh-CN" altLang="en-US">
+                      <a:noFill/>
+                    </a:rPr>
+                    <a:t> </a:t>
+                  </a:r>
+                </a:p>
+              </p:txBody>
+            </p:sp>
+          </mc:Fallback>
+        </mc:AlternateContent>
+      </p:grpSp>
+    </p:spTree>
+    <p:extLst>
+      <p:ext uri="{BB962C8B-B14F-4D97-AF65-F5344CB8AC3E}">
+        <p14:creationId xmlns:p14="http://schemas.microsoft.com/office/powerpoint/2010/main" val="3713959586"/>
       </p:ext>
     </p:extLst>
   </p:cSld>

</xml_diff>